<commit_message>
Documentation/User manual/MACOM...pptx: Made slight changes; to table of contents, date
</commit_message>
<xml_diff>
--- a/Documentation/User manual/MACOM RI Pulsed RF Application Note.pptx
+++ b/Documentation/User manual/MACOM RI Pulsed RF Application Note.pptx
@@ -314,7 +314,7 @@
               <a:pPr>
                 <a:defRPr/>
               </a:pPr>
-              <a:t>4/3/2016</a:t>
+              <a:t>4/4/2016</a:t>
             </a:fld>
             <a:endParaRPr lang="en-US"/>
           </a:p>
@@ -537,7 +537,7 @@
               <a:pPr>
                 <a:defRPr/>
               </a:pPr>
-              <a:t>4/3/2016</a:t>
+              <a:t>4/4/2016</a:t>
             </a:fld>
             <a:endParaRPr lang="en-US" dirty="0"/>
           </a:p>
@@ -926,14 +926,14 @@
           </a:ln>
           <a:extLst>
             <a:ext uri="{909E8E84-426E-40dd-AFC4-6F175D3DCCD1}">
-              <a14:hiddenFill xmlns:a14="http://schemas.microsoft.com/office/drawing/2010/main" xmlns="">
+              <a14:hiddenFill xmlns="" xmlns:a14="http://schemas.microsoft.com/office/drawing/2010/main">
                 <a:solidFill>
                   <a:srgbClr val="FFFFFF"/>
                 </a:solidFill>
               </a14:hiddenFill>
             </a:ext>
             <a:ext uri="{91240B29-F687-4f45-9708-019B960494DF}">
-              <a14:hiddenLine xmlns:a14="http://schemas.microsoft.com/office/drawing/2010/main" xmlns="" w="9525">
+              <a14:hiddenLine xmlns="" xmlns:a14="http://schemas.microsoft.com/office/drawing/2010/main" w="9525">
                 <a:solidFill>
                   <a:srgbClr val="000000"/>
                 </a:solidFill>
@@ -980,14 +980,14 @@
           </a:ln>
           <a:extLst>
             <a:ext uri="{909E8E84-426E-40dd-AFC4-6F175D3DCCD1}">
-              <a14:hiddenFill xmlns:a14="http://schemas.microsoft.com/office/drawing/2010/main" xmlns="">
+              <a14:hiddenFill xmlns="" xmlns:a14="http://schemas.microsoft.com/office/drawing/2010/main">
                 <a:solidFill>
                   <a:srgbClr val="FFFFFF"/>
                 </a:solidFill>
               </a14:hiddenFill>
             </a:ext>
             <a:ext uri="{91240B29-F687-4f45-9708-019B960494DF}">
-              <a14:hiddenLine xmlns:a14="http://schemas.microsoft.com/office/drawing/2010/main" xmlns="" w="9525">
+              <a14:hiddenLine xmlns="" xmlns:a14="http://schemas.microsoft.com/office/drawing/2010/main" w="9525">
                 <a:solidFill>
                   <a:srgbClr val="000000"/>
                 </a:solidFill>
@@ -4144,14 +4144,14 @@
           </a:ln>
           <a:extLst>
             <a:ext uri="{909E8E84-426E-40dd-AFC4-6F175D3DCCD1}">
-              <a14:hiddenFill xmlns:a14="http://schemas.microsoft.com/office/drawing/2010/main" xmlns="">
+              <a14:hiddenFill xmlns="" xmlns:a14="http://schemas.microsoft.com/office/drawing/2010/main">
                 <a:solidFill>
                   <a:srgbClr val="FFFFFF"/>
                 </a:solidFill>
               </a14:hiddenFill>
             </a:ext>
             <a:ext uri="{91240B29-F687-4f45-9708-019B960494DF}">
-              <a14:hiddenLine xmlns:a14="http://schemas.microsoft.com/office/drawing/2010/main" xmlns="" w="9525">
+              <a14:hiddenLine xmlns="" xmlns:a14="http://schemas.microsoft.com/office/drawing/2010/main" w="9525">
                 <a:solidFill>
                   <a:srgbClr val="000000"/>
                 </a:solidFill>
@@ -5126,14 +5126,14 @@
           </a:effectLst>
           <a:extLst>
             <a:ext uri="{909E8E84-426E-40dd-AFC4-6F175D3DCCD1}">
-              <a14:hiddenFill xmlns:a14="http://schemas.microsoft.com/office/drawing/2010/main" xmlns="">
+              <a14:hiddenFill xmlns="" xmlns:a14="http://schemas.microsoft.com/office/drawing/2010/main">
                 <a:solidFill>
                   <a:srgbClr val="FFFFFF"/>
                 </a:solidFill>
               </a14:hiddenFill>
             </a:ext>
             <a:ext uri="{91240B29-F687-4f45-9708-019B960494DF}">
-              <a14:hiddenLine xmlns:a14="http://schemas.microsoft.com/office/drawing/2010/main" xmlns="" w="9525">
+              <a14:hiddenLine xmlns="" xmlns:a14="http://schemas.microsoft.com/office/drawing/2010/main" w="9525">
                 <a:solidFill>
                   <a:srgbClr val="000000"/>
                 </a:solidFill>
@@ -5169,14 +5169,14 @@
           </a:ln>
           <a:extLst>
             <a:ext uri="{909E8E84-426E-40dd-AFC4-6F175D3DCCD1}">
-              <a14:hiddenFill xmlns:a14="http://schemas.microsoft.com/office/drawing/2010/main" xmlns="">
+              <a14:hiddenFill xmlns="" xmlns:a14="http://schemas.microsoft.com/office/drawing/2010/main">
                 <a:solidFill>
                   <a:srgbClr val="FFFFFF"/>
                 </a:solidFill>
               </a14:hiddenFill>
             </a:ext>
             <a:ext uri="{91240B29-F687-4f45-9708-019B960494DF}">
-              <a14:hiddenLine xmlns:a14="http://schemas.microsoft.com/office/drawing/2010/main" xmlns="" w="9525">
+              <a14:hiddenLine xmlns="" xmlns:a14="http://schemas.microsoft.com/office/drawing/2010/main" w="9525">
                 <a:solidFill>
                   <a:srgbClr val="000000"/>
                 </a:solidFill>
@@ -5873,7 +5873,7 @@
           <a:p>
             <a:r>
               <a:rPr lang="en-US" sz="1800" dirty="0" smtClean="0"/>
-              <a:t>March 30</a:t>
+              <a:t>April 4</a:t>
             </a:r>
             <a:r>
               <a:rPr lang="en-US" sz="1800" baseline="30000" dirty="0" smtClean="0"/>
@@ -5881,7 +5881,11 @@
             </a:r>
             <a:r>
               <a:rPr lang="en-US" sz="1800" dirty="0" smtClean="0"/>
-              <a:t>, 2016</a:t>
+              <a:t>, </a:t>
+            </a:r>
+            <a:r>
+              <a:rPr lang="en-US" sz="1800" dirty="0" smtClean="0"/>
+              <a:t>2016</a:t>
             </a:r>
             <a:endParaRPr lang="en-US" sz="1800" i="1" dirty="0" smtClean="0"/>
           </a:p>
@@ -14250,11 +14254,7 @@
           <a:p>
             <a:r>
               <a:rPr lang="en-US" dirty="0" smtClean="0"/>
-              <a:t>Physical </a:t>
-            </a:r>
-            <a:r>
-              <a:rPr lang="en-US" dirty="0" smtClean="0"/>
-              <a:t>setup</a:t>
+              <a:t>Hardware Configuration</a:t>
             </a:r>
             <a:endParaRPr lang="en-US" dirty="0" smtClean="0"/>
           </a:p>
@@ -14263,17 +14263,12 @@
               <a:rPr lang="en-US" dirty="0" smtClean="0"/>
               <a:t>Calibration</a:t>
             </a:r>
-            <a:endParaRPr lang="en-US" dirty="0" smtClean="0"/>
           </a:p>
           <a:p>
             <a:pPr lvl="1"/>
             <a:r>
               <a:rPr lang="en-US" dirty="0" smtClean="0"/>
-              <a:t>ZVAX Pulse </a:t>
-            </a:r>
-            <a:r>
-              <a:rPr lang="en-US" dirty="0" smtClean="0"/>
-              <a:t>modulator on</a:t>
+              <a:t>ZVAX Pulse modulator on</a:t>
             </a:r>
           </a:p>
           <a:p>
@@ -14297,7 +14292,6 @@
               <a:rPr lang="en-US" dirty="0" smtClean="0"/>
               <a:t>One Path Two Port</a:t>
             </a:r>
-            <a:endParaRPr lang="en-US" dirty="0" smtClean="0"/>
           </a:p>
           <a:p>
             <a:pPr lvl="1"/>
@@ -14305,14 +14299,12 @@
               <a:rPr lang="en-US" dirty="0" smtClean="0"/>
               <a:t>Source Power Cal</a:t>
             </a:r>
-            <a:endParaRPr lang="en-US" dirty="0" smtClean="0"/>
           </a:p>
           <a:p>
             <a:r>
               <a:rPr lang="en-US" dirty="0" smtClean="0"/>
               <a:t>Pulsed RF</a:t>
             </a:r>
-            <a:endParaRPr lang="en-US" dirty="0" smtClean="0"/>
           </a:p>
           <a:p>
             <a:pPr lvl="1"/>
@@ -14320,7 +14312,6 @@
               <a:rPr lang="en-US" dirty="0" smtClean="0"/>
               <a:t>Pulse Type: Single Pulse</a:t>
             </a:r>
-            <a:endParaRPr lang="en-US" dirty="0" smtClean="0"/>
           </a:p>
           <a:p>
             <a:pPr lvl="1"/>
@@ -14328,7 +14319,6 @@
               <a:rPr lang="en-US" dirty="0" smtClean="0"/>
               <a:t>Trigger: Rising Edge Pulse</a:t>
             </a:r>
-            <a:endParaRPr lang="en-US" dirty="0" smtClean="0"/>
           </a:p>
           <a:p>
             <a:pPr lvl="1"/>
@@ -14336,7 +14326,6 @@
               <a:rPr lang="en-US" dirty="0" smtClean="0"/>
               <a:t>Trigger measurement: Point</a:t>
             </a:r>
-            <a:endParaRPr lang="en-US" dirty="0" smtClean="0"/>
           </a:p>
           <a:p>
             <a:pPr lvl="1"/>
@@ -14818,14 +14807,7 @@
                 <a:latin typeface="Courier New" pitchFamily="49" charset="0"/>
                 <a:cs typeface="Courier New" pitchFamily="49" charset="0"/>
               </a:rPr>
-              <a:t>  San </a:t>
-            </a:r>
-            <a:r>
-              <a:rPr lang="en-US" dirty="0" smtClean="0">
-                <a:latin typeface="Courier New" pitchFamily="49" charset="0"/>
-                <a:cs typeface="Courier New" pitchFamily="49" charset="0"/>
-              </a:rPr>
-              <a:t>Francisco, CA</a:t>
+              <a:t>  San Francisco, CA</a:t>
             </a:r>
           </a:p>
           <a:p>
@@ -14954,14 +14936,7 @@
                 <a:latin typeface="Courier New" pitchFamily="49" charset="0"/>
                 <a:cs typeface="Courier New" pitchFamily="49" charset="0"/>
               </a:rPr>
-              <a:t>  Senior </a:t>
-            </a:r>
-            <a:r>
-              <a:rPr lang="en-US" dirty="0" smtClean="0">
-                <a:latin typeface="Courier New" pitchFamily="49" charset="0"/>
-                <a:cs typeface="Courier New" pitchFamily="49" charset="0"/>
-              </a:rPr>
-              <a:t>Product Line Engineer</a:t>
+              <a:t>  Senior Product Line Engineer</a:t>
             </a:r>
           </a:p>
           <a:p>
@@ -14996,33 +14971,19 @@
                 <a:latin typeface="Courier New" pitchFamily="49" charset="0"/>
                 <a:cs typeface="Courier New" pitchFamily="49" charset="0"/>
               </a:rPr>
-              <a:t>  Vector </a:t>
-            </a:r>
+              <a:t>  Vector Network Analyzers</a:t>
+            </a:r>
+          </a:p>
+          <a:p>
+            <a:pPr marL="539138" lvl="3" indent="0">
+              <a:buNone/>
+            </a:pPr>
             <a:r>
               <a:rPr lang="en-US" dirty="0" smtClean="0">
                 <a:latin typeface="Courier New" pitchFamily="49" charset="0"/>
                 <a:cs typeface="Courier New" pitchFamily="49" charset="0"/>
               </a:rPr>
-              <a:t>Network Analyzers</a:t>
-            </a:r>
-          </a:p>
-          <a:p>
-            <a:pPr marL="539138" lvl="3" indent="0">
-              <a:buNone/>
-            </a:pPr>
-            <a:r>
-              <a:rPr lang="en-US" dirty="0" smtClean="0">
-                <a:latin typeface="Courier New" pitchFamily="49" charset="0"/>
-                <a:cs typeface="Courier New" pitchFamily="49" charset="0"/>
-              </a:rPr>
-              <a:t>  Northeastern </a:t>
-            </a:r>
-            <a:r>
-              <a:rPr lang="en-US" dirty="0" smtClean="0">
-                <a:latin typeface="Courier New" pitchFamily="49" charset="0"/>
-                <a:cs typeface="Courier New" pitchFamily="49" charset="0"/>
-              </a:rPr>
-              <a:t>Region</a:t>
+              <a:t>  Northeastern Region</a:t>
             </a:r>
           </a:p>
           <a:p>

</xml_diff>

<commit_message>
Documentation/User manual/MACOM...pptx: Added ZVA filter sampling times for pulse width consideration. PPT is done; sent to Jerome.
</commit_message>
<xml_diff>
--- a/Documentation/User manual/MACOM RI Pulsed RF Application Note.pptx
+++ b/Documentation/User manual/MACOM RI Pulsed RF Application Note.pptx
@@ -5,10 +5,10 @@
     <p:sldMasterId id="2147483744" r:id="rId1"/>
   </p:sldMasterIdLst>
   <p:notesMasterIdLst>
-    <p:notesMasterId r:id="rId23"/>
+    <p:notesMasterId r:id="rId24"/>
   </p:notesMasterIdLst>
   <p:handoutMasterIdLst>
-    <p:handoutMasterId r:id="rId24"/>
+    <p:handoutMasterId r:id="rId25"/>
   </p:handoutMasterIdLst>
   <p:sldIdLst>
     <p:sldId id="256" r:id="rId2"/>
@@ -29,9 +29,10 @@
     <p:sldId id="535" r:id="rId17"/>
     <p:sldId id="536" r:id="rId18"/>
     <p:sldId id="537" r:id="rId19"/>
-    <p:sldId id="538" r:id="rId20"/>
-    <p:sldId id="539" r:id="rId21"/>
-    <p:sldId id="471" r:id="rId22"/>
+    <p:sldId id="540" r:id="rId20"/>
+    <p:sldId id="538" r:id="rId21"/>
+    <p:sldId id="539" r:id="rId22"/>
+    <p:sldId id="471" r:id="rId23"/>
   </p:sldIdLst>
   <p:sldSz cx="9144000" cy="6858000" type="screen4x3"/>
   <p:notesSz cx="7104063" cy="10234613"/>
@@ -926,14 +927,14 @@
           </a:ln>
           <a:extLst>
             <a:ext uri="{909E8E84-426E-40dd-AFC4-6F175D3DCCD1}">
-              <a14:hiddenFill xmlns="" xmlns:a14="http://schemas.microsoft.com/office/drawing/2010/main">
+              <a14:hiddenFill xmlns:a14="http://schemas.microsoft.com/office/drawing/2010/main" xmlns="">
                 <a:solidFill>
                   <a:srgbClr val="FFFFFF"/>
                 </a:solidFill>
               </a14:hiddenFill>
             </a:ext>
             <a:ext uri="{91240B29-F687-4f45-9708-019B960494DF}">
-              <a14:hiddenLine xmlns="" xmlns:a14="http://schemas.microsoft.com/office/drawing/2010/main" w="9525">
+              <a14:hiddenLine xmlns:a14="http://schemas.microsoft.com/office/drawing/2010/main" xmlns="" w="9525">
                 <a:solidFill>
                   <a:srgbClr val="000000"/>
                 </a:solidFill>
@@ -980,14 +981,14 @@
           </a:ln>
           <a:extLst>
             <a:ext uri="{909E8E84-426E-40dd-AFC4-6F175D3DCCD1}">
-              <a14:hiddenFill xmlns="" xmlns:a14="http://schemas.microsoft.com/office/drawing/2010/main">
+              <a14:hiddenFill xmlns:a14="http://schemas.microsoft.com/office/drawing/2010/main" xmlns="">
                 <a:solidFill>
                   <a:srgbClr val="FFFFFF"/>
                 </a:solidFill>
               </a14:hiddenFill>
             </a:ext>
             <a:ext uri="{91240B29-F687-4f45-9708-019B960494DF}">
-              <a14:hiddenLine xmlns="" xmlns:a14="http://schemas.microsoft.com/office/drawing/2010/main" w="9525">
+              <a14:hiddenLine xmlns:a14="http://schemas.microsoft.com/office/drawing/2010/main" xmlns="" w="9525">
                 <a:solidFill>
                   <a:srgbClr val="000000"/>
                 </a:solidFill>
@@ -4144,14 +4145,14 @@
           </a:ln>
           <a:extLst>
             <a:ext uri="{909E8E84-426E-40dd-AFC4-6F175D3DCCD1}">
-              <a14:hiddenFill xmlns="" xmlns:a14="http://schemas.microsoft.com/office/drawing/2010/main">
+              <a14:hiddenFill xmlns:a14="http://schemas.microsoft.com/office/drawing/2010/main" xmlns="">
                 <a:solidFill>
                   <a:srgbClr val="FFFFFF"/>
                 </a:solidFill>
               </a14:hiddenFill>
             </a:ext>
             <a:ext uri="{91240B29-F687-4f45-9708-019B960494DF}">
-              <a14:hiddenLine xmlns="" xmlns:a14="http://schemas.microsoft.com/office/drawing/2010/main" w="9525">
+              <a14:hiddenLine xmlns:a14="http://schemas.microsoft.com/office/drawing/2010/main" xmlns="" w="9525">
                 <a:solidFill>
                   <a:srgbClr val="000000"/>
                 </a:solidFill>
@@ -5126,14 +5127,14 @@
           </a:effectLst>
           <a:extLst>
             <a:ext uri="{909E8E84-426E-40dd-AFC4-6F175D3DCCD1}">
-              <a14:hiddenFill xmlns="" xmlns:a14="http://schemas.microsoft.com/office/drawing/2010/main">
+              <a14:hiddenFill xmlns:a14="http://schemas.microsoft.com/office/drawing/2010/main" xmlns="">
                 <a:solidFill>
                   <a:srgbClr val="FFFFFF"/>
                 </a:solidFill>
               </a14:hiddenFill>
             </a:ext>
             <a:ext uri="{91240B29-F687-4f45-9708-019B960494DF}">
-              <a14:hiddenLine xmlns="" xmlns:a14="http://schemas.microsoft.com/office/drawing/2010/main" w="9525">
+              <a14:hiddenLine xmlns:a14="http://schemas.microsoft.com/office/drawing/2010/main" xmlns="" w="9525">
                 <a:solidFill>
                   <a:srgbClr val="000000"/>
                 </a:solidFill>
@@ -5169,14 +5170,14 @@
           </a:ln>
           <a:extLst>
             <a:ext uri="{909E8E84-426E-40dd-AFC4-6F175D3DCCD1}">
-              <a14:hiddenFill xmlns="" xmlns:a14="http://schemas.microsoft.com/office/drawing/2010/main">
+              <a14:hiddenFill xmlns:a14="http://schemas.microsoft.com/office/drawing/2010/main" xmlns="">
                 <a:solidFill>
                   <a:srgbClr val="FFFFFF"/>
                 </a:solidFill>
               </a14:hiddenFill>
             </a:ext>
             <a:ext uri="{91240B29-F687-4f45-9708-019B960494DF}">
-              <a14:hiddenLine xmlns="" xmlns:a14="http://schemas.microsoft.com/office/drawing/2010/main" w="9525">
+              <a14:hiddenLine xmlns:a14="http://schemas.microsoft.com/office/drawing/2010/main" xmlns="" w="9525">
                 <a:solidFill>
                   <a:srgbClr val="000000"/>
                 </a:solidFill>
@@ -5881,11 +5882,7 @@
             </a:r>
             <a:r>
               <a:rPr lang="en-US" sz="1800" dirty="0" smtClean="0"/>
-              <a:t>, </a:t>
-            </a:r>
-            <a:r>
-              <a:rPr lang="en-US" sz="1800" dirty="0" smtClean="0"/>
-              <a:t>2016</a:t>
+              <a:t>, 2016</a:t>
             </a:r>
             <a:endParaRPr lang="en-US" sz="1800" i="1" dirty="0" smtClean="0"/>
           </a:p>
@@ -13941,8 +13938,8 @@
         </p:blipFill>
         <p:spPr>
           <a:xfrm>
-            <a:off x="5868144" y="1700680"/>
-            <a:ext cx="2016224" cy="3390978"/>
+            <a:off x="5868144" y="1556792"/>
+            <a:ext cx="2448272" cy="4117616"/>
           </a:xfrm>
           <a:prstGeom prst="rect">
             <a:avLst/>
@@ -13969,7 +13966,7 @@
         </p:nvCxnSpPr>
         <p:spPr>
           <a:xfrm>
-            <a:off x="5580112" y="2060848"/>
+            <a:off x="5580112" y="1988840"/>
             <a:ext cx="432048" cy="0"/>
           </a:xfrm>
           <a:prstGeom prst="straightConnector1">
@@ -14064,20 +14061,24 @@
           <a:p>
             <a:r>
               <a:rPr lang="en-US" dirty="0" smtClean="0"/>
-              <a:t>Sweep -&gt; Trigger -&gt; Pulse Gen…</a:t>
-            </a:r>
-          </a:p>
-          <a:p>
-            <a:r>
+              <a:t>Note:</a:t>
+            </a:r>
+            <a:br>
               <a:rPr lang="en-US" dirty="0" smtClean="0"/>
-              <a:t>Rising Edge Pulse</a:t>
-            </a:r>
-          </a:p>
-          <a:p>
+            </a:br>
             <a:r>
               <a:rPr lang="en-US" dirty="0" smtClean="0"/>
-              <a:t>Pulse Gen... Should be selected</a:t>
-            </a:r>
+              <a:t>Pulse width must be longer than sampling time</a:t>
+            </a:r>
+          </a:p>
+          <a:p>
+            <a:r>
+              <a:rPr lang="en-US" dirty="0" smtClean="0"/>
+              <a:t>Reference table:</a:t>
+            </a:r>
+          </a:p>
+          <a:p>
+            <a:endParaRPr lang="en-US" dirty="0" smtClean="0"/>
           </a:p>
         </p:txBody>
       </p:sp>
@@ -14105,6 +14106,338 @@
                 <a:defRPr/>
               </a:pPr>
               <a:t>19</a:t>
+            </a:fld>
+            <a:endParaRPr lang="en-US" dirty="0"/>
+          </a:p>
+        </p:txBody>
+      </p:sp>
+      <p:pic>
+        <p:nvPicPr>
+          <p:cNvPr id="2" name="Picture 1"/>
+          <p:cNvPicPr>
+            <a:picLocks noChangeAspect="1"/>
+          </p:cNvPicPr>
+          <p:nvPr/>
+        </p:nvPicPr>
+        <p:blipFill>
+          <a:blip r:embed="rId2"/>
+          <a:stretch>
+            <a:fillRect/>
+          </a:stretch>
+        </p:blipFill>
+        <p:spPr>
+          <a:xfrm>
+            <a:off x="2087836" y="2420888"/>
+            <a:ext cx="4968329" cy="3428459"/>
+          </a:xfrm>
+          <a:prstGeom prst="rect">
+            <a:avLst/>
+          </a:prstGeom>
+          <a:ln>
+            <a:solidFill>
+              <a:schemeClr val="tx1"/>
+            </a:solidFill>
+          </a:ln>
+          <a:effectLst>
+            <a:outerShdw blurRad="50800" dist="38100" dir="2700000" algn="tl" rotWithShape="0">
+              <a:prstClr val="black">
+                <a:alpha val="40000"/>
+              </a:prstClr>
+            </a:outerShdw>
+          </a:effectLst>
+        </p:spPr>
+      </p:pic>
+    </p:spTree>
+    <p:extLst>
+      <p:ext uri="{BB962C8B-B14F-4D97-AF65-F5344CB8AC3E}">
+        <p14:creationId xmlns:p14="http://schemas.microsoft.com/office/powerpoint/2010/main" val="220701266"/>
+      </p:ext>
+    </p:extLst>
+  </p:cSld>
+  <p:clrMapOvr>
+    <a:masterClrMapping/>
+  </p:clrMapOvr>
+</p:sld>
+</file>
+
+<file path=ppt/slides/slide2.xml><?xml version="1.0" encoding="utf-8"?>
+<p:sld xmlns:a="http://schemas.openxmlformats.org/drawingml/2006/main" xmlns:r="http://schemas.openxmlformats.org/officeDocument/2006/relationships" xmlns:p="http://schemas.openxmlformats.org/presentationml/2006/main">
+  <p:cSld>
+    <p:spTree>
+      <p:nvGrpSpPr>
+        <p:cNvPr id="1" name=""/>
+        <p:cNvGrpSpPr/>
+        <p:nvPr/>
+      </p:nvGrpSpPr>
+      <p:grpSpPr>
+        <a:xfrm>
+          <a:off x="0" y="0"/>
+          <a:ext cx="0" cy="0"/>
+          <a:chOff x="0" y="0"/>
+          <a:chExt cx="0" cy="0"/>
+        </a:xfrm>
+      </p:grpSpPr>
+      <p:sp>
+        <p:nvSpPr>
+          <p:cNvPr id="2" name="Title 1"/>
+          <p:cNvSpPr>
+            <a:spLocks noGrp="1"/>
+          </p:cNvSpPr>
+          <p:nvPr>
+            <p:ph type="title"/>
+          </p:nvPr>
+        </p:nvSpPr>
+        <p:spPr/>
+        <p:txBody>
+          <a:bodyPr/>
+          <a:lstStyle/>
+          <a:p>
+            <a:r>
+              <a:rPr lang="en-US" dirty="0" smtClean="0"/>
+              <a:t>Sections</a:t>
+            </a:r>
+            <a:endParaRPr lang="en-US" dirty="0"/>
+          </a:p>
+        </p:txBody>
+      </p:sp>
+      <p:sp>
+        <p:nvSpPr>
+          <p:cNvPr id="3" name="Content Placeholder 2"/>
+          <p:cNvSpPr>
+            <a:spLocks noGrp="1"/>
+          </p:cNvSpPr>
+          <p:nvPr>
+            <p:ph idx="1"/>
+          </p:nvPr>
+        </p:nvSpPr>
+        <p:spPr/>
+        <p:txBody>
+          <a:bodyPr/>
+          <a:lstStyle/>
+          <a:p>
+            <a:r>
+              <a:rPr lang="en-US" dirty="0" smtClean="0"/>
+              <a:t>Hardware Configuration</a:t>
+            </a:r>
+          </a:p>
+          <a:p>
+            <a:r>
+              <a:rPr lang="en-US" dirty="0" smtClean="0"/>
+              <a:t>Calibration</a:t>
+            </a:r>
+          </a:p>
+          <a:p>
+            <a:pPr lvl="1"/>
+            <a:r>
+              <a:rPr lang="en-US" dirty="0" smtClean="0"/>
+              <a:t>ZVAX Pulse modulator on</a:t>
+            </a:r>
+          </a:p>
+          <a:p>
+            <a:pPr lvl="1"/>
+            <a:r>
+              <a:rPr lang="en-US" dirty="0" smtClean="0"/>
+              <a:t>Pulse Gen: Constant High</a:t>
+            </a:r>
+          </a:p>
+          <a:p>
+            <a:pPr lvl="1"/>
+            <a:r>
+              <a:rPr lang="en-US" dirty="0"/>
+              <a:t>Trigger: Free Run</a:t>
+            </a:r>
+            <a:endParaRPr lang="en-US" dirty="0" smtClean="0"/>
+          </a:p>
+          <a:p>
+            <a:pPr lvl="1"/>
+            <a:r>
+              <a:rPr lang="en-US" dirty="0" smtClean="0"/>
+              <a:t>One Path Two Port</a:t>
+            </a:r>
+          </a:p>
+          <a:p>
+            <a:pPr lvl="1"/>
+            <a:r>
+              <a:rPr lang="en-US" dirty="0" smtClean="0"/>
+              <a:t>Source Power Cal</a:t>
+            </a:r>
+          </a:p>
+          <a:p>
+            <a:r>
+              <a:rPr lang="en-US" dirty="0" smtClean="0"/>
+              <a:t>Pulsed RF</a:t>
+            </a:r>
+          </a:p>
+          <a:p>
+            <a:pPr lvl="1"/>
+            <a:r>
+              <a:rPr lang="en-US" dirty="0" smtClean="0"/>
+              <a:t>Pulse Type: Single Pulse</a:t>
+            </a:r>
+          </a:p>
+          <a:p>
+            <a:pPr lvl="1"/>
+            <a:r>
+              <a:rPr lang="en-US" dirty="0" smtClean="0"/>
+              <a:t>Trigger: Rising Edge Pulse</a:t>
+            </a:r>
+          </a:p>
+          <a:p>
+            <a:pPr lvl="1"/>
+            <a:r>
+              <a:rPr lang="en-US" dirty="0" smtClean="0"/>
+              <a:t>Trigger measurement: Point</a:t>
+            </a:r>
+          </a:p>
+          <a:p>
+            <a:pPr lvl="1"/>
+            <a:endParaRPr lang="en-US" dirty="0" smtClean="0"/>
+          </a:p>
+          <a:p>
+            <a:endParaRPr lang="en-US" dirty="0"/>
+          </a:p>
+        </p:txBody>
+      </p:sp>
+      <p:sp>
+        <p:nvSpPr>
+          <p:cNvPr id="4" name="Slide Number Placeholder 3"/>
+          <p:cNvSpPr>
+            <a:spLocks noGrp="1"/>
+          </p:cNvSpPr>
+          <p:nvPr>
+            <p:ph type="sldNum" sz="quarter" idx="10"/>
+          </p:nvPr>
+        </p:nvSpPr>
+        <p:spPr/>
+        <p:txBody>
+          <a:bodyPr/>
+          <a:lstStyle/>
+          <a:p>
+            <a:pPr>
+              <a:defRPr/>
+            </a:pPr>
+            <a:fld id="{C2257212-E44F-4C49-9A79-F22BDE7B0592}" type="slidenum">
+              <a:rPr lang="en-US" smtClean="0"/>
+              <a:pPr>
+                <a:defRPr/>
+              </a:pPr>
+              <a:t>2</a:t>
+            </a:fld>
+            <a:endParaRPr lang="en-US" dirty="0"/>
+          </a:p>
+        </p:txBody>
+      </p:sp>
+    </p:spTree>
+    <p:extLst>
+      <p:ext uri="{BB962C8B-B14F-4D97-AF65-F5344CB8AC3E}">
+        <p14:creationId xmlns:p14="http://schemas.microsoft.com/office/powerpoint/2010/main" val="2028291349"/>
+      </p:ext>
+    </p:extLst>
+  </p:cSld>
+  <p:clrMapOvr>
+    <a:masterClrMapping/>
+  </p:clrMapOvr>
+</p:sld>
+</file>
+
+<file path=ppt/slides/slide20.xml><?xml version="1.0" encoding="utf-8"?>
+<p:sld xmlns:a="http://schemas.openxmlformats.org/drawingml/2006/main" xmlns:r="http://schemas.openxmlformats.org/officeDocument/2006/relationships" xmlns:p="http://schemas.openxmlformats.org/presentationml/2006/main">
+  <p:cSld>
+    <p:spTree>
+      <p:nvGrpSpPr>
+        <p:cNvPr id="1" name=""/>
+        <p:cNvGrpSpPr/>
+        <p:nvPr/>
+      </p:nvGrpSpPr>
+      <p:grpSpPr>
+        <a:xfrm>
+          <a:off x="0" y="0"/>
+          <a:ext cx="0" cy="0"/>
+          <a:chOff x="0" y="0"/>
+          <a:chExt cx="0" cy="0"/>
+        </a:xfrm>
+      </p:grpSpPr>
+      <p:sp>
+        <p:nvSpPr>
+          <p:cNvPr id="6" name="Title 5"/>
+          <p:cNvSpPr>
+            <a:spLocks noGrp="1"/>
+          </p:cNvSpPr>
+          <p:nvPr>
+            <p:ph type="title"/>
+          </p:nvPr>
+        </p:nvSpPr>
+        <p:spPr/>
+        <p:txBody>
+          <a:bodyPr/>
+          <a:lstStyle/>
+          <a:p>
+            <a:r>
+              <a:rPr lang="en-US" dirty="0" smtClean="0"/>
+              <a:t>Pulsed RF</a:t>
+            </a:r>
+            <a:endParaRPr lang="en-US" dirty="0"/>
+          </a:p>
+        </p:txBody>
+      </p:sp>
+      <p:sp>
+        <p:nvSpPr>
+          <p:cNvPr id="4" name="Content Placeholder 3"/>
+          <p:cNvSpPr>
+            <a:spLocks noGrp="1"/>
+          </p:cNvSpPr>
+          <p:nvPr>
+            <p:ph idx="1"/>
+          </p:nvPr>
+        </p:nvSpPr>
+        <p:spPr/>
+        <p:txBody>
+          <a:bodyPr/>
+          <a:lstStyle/>
+          <a:p>
+            <a:r>
+              <a:rPr lang="en-US" dirty="0" smtClean="0"/>
+              <a:t>Sweep -&gt; Trigger -&gt; Pulse Gen…</a:t>
+            </a:r>
+          </a:p>
+          <a:p>
+            <a:r>
+              <a:rPr lang="en-US" dirty="0" smtClean="0"/>
+              <a:t>Rising Edge Pulse</a:t>
+            </a:r>
+          </a:p>
+          <a:p>
+            <a:r>
+              <a:rPr lang="en-US" dirty="0" smtClean="0"/>
+              <a:t>Pulse Gen... Should be selected</a:t>
+            </a:r>
+          </a:p>
+        </p:txBody>
+      </p:sp>
+      <p:sp>
+        <p:nvSpPr>
+          <p:cNvPr id="5" name="Slide Number Placeholder 4"/>
+          <p:cNvSpPr>
+            <a:spLocks noGrp="1"/>
+          </p:cNvSpPr>
+          <p:nvPr>
+            <p:ph type="sldNum" sz="quarter" idx="10"/>
+          </p:nvPr>
+        </p:nvSpPr>
+        <p:spPr/>
+        <p:txBody>
+          <a:bodyPr/>
+          <a:lstStyle/>
+          <a:p>
+            <a:pPr>
+              <a:defRPr/>
+            </a:pPr>
+            <a:fld id="{3F9FD513-5D4A-4BCF-8AE8-1EA4ADEA97B0}" type="slidenum">
+              <a:rPr lang="en-US" smtClean="0"/>
+              <a:pPr>
+                <a:defRPr/>
+              </a:pPr>
+              <a:t>20</a:t>
             </a:fld>
             <a:endParaRPr lang="en-US" dirty="0"/>
           </a:p>
@@ -14197,188 +14530,7 @@
 </p:sld>
 </file>
 
-<file path=ppt/slides/slide2.xml><?xml version="1.0" encoding="utf-8"?>
-<p:sld xmlns:a="http://schemas.openxmlformats.org/drawingml/2006/main" xmlns:r="http://schemas.openxmlformats.org/officeDocument/2006/relationships" xmlns:p="http://schemas.openxmlformats.org/presentationml/2006/main">
-  <p:cSld>
-    <p:spTree>
-      <p:nvGrpSpPr>
-        <p:cNvPr id="1" name=""/>
-        <p:cNvGrpSpPr/>
-        <p:nvPr/>
-      </p:nvGrpSpPr>
-      <p:grpSpPr>
-        <a:xfrm>
-          <a:off x="0" y="0"/>
-          <a:ext cx="0" cy="0"/>
-          <a:chOff x="0" y="0"/>
-          <a:chExt cx="0" cy="0"/>
-        </a:xfrm>
-      </p:grpSpPr>
-      <p:sp>
-        <p:nvSpPr>
-          <p:cNvPr id="2" name="Title 1"/>
-          <p:cNvSpPr>
-            <a:spLocks noGrp="1"/>
-          </p:cNvSpPr>
-          <p:nvPr>
-            <p:ph type="title"/>
-          </p:nvPr>
-        </p:nvSpPr>
-        <p:spPr/>
-        <p:txBody>
-          <a:bodyPr/>
-          <a:lstStyle/>
-          <a:p>
-            <a:r>
-              <a:rPr lang="en-US" dirty="0" smtClean="0"/>
-              <a:t>Sections</a:t>
-            </a:r>
-            <a:endParaRPr lang="en-US" dirty="0"/>
-          </a:p>
-        </p:txBody>
-      </p:sp>
-      <p:sp>
-        <p:nvSpPr>
-          <p:cNvPr id="3" name="Content Placeholder 2"/>
-          <p:cNvSpPr>
-            <a:spLocks noGrp="1"/>
-          </p:cNvSpPr>
-          <p:nvPr>
-            <p:ph idx="1"/>
-          </p:nvPr>
-        </p:nvSpPr>
-        <p:spPr/>
-        <p:txBody>
-          <a:bodyPr/>
-          <a:lstStyle/>
-          <a:p>
-            <a:r>
-              <a:rPr lang="en-US" dirty="0" smtClean="0"/>
-              <a:t>Hardware Configuration</a:t>
-            </a:r>
-            <a:endParaRPr lang="en-US" dirty="0" smtClean="0"/>
-          </a:p>
-          <a:p>
-            <a:r>
-              <a:rPr lang="en-US" dirty="0" smtClean="0"/>
-              <a:t>Calibration</a:t>
-            </a:r>
-          </a:p>
-          <a:p>
-            <a:pPr lvl="1"/>
-            <a:r>
-              <a:rPr lang="en-US" dirty="0" smtClean="0"/>
-              <a:t>ZVAX Pulse modulator on</a:t>
-            </a:r>
-          </a:p>
-          <a:p>
-            <a:pPr lvl="1"/>
-            <a:r>
-              <a:rPr lang="en-US" dirty="0" smtClean="0"/>
-              <a:t>Pulse Gen: Constant High</a:t>
-            </a:r>
-          </a:p>
-          <a:p>
-            <a:pPr lvl="1"/>
-            <a:r>
-              <a:rPr lang="en-US" dirty="0"/>
-              <a:t>Trigger: Free Run</a:t>
-            </a:r>
-            <a:endParaRPr lang="en-US" dirty="0" smtClean="0"/>
-          </a:p>
-          <a:p>
-            <a:pPr lvl="1"/>
-            <a:r>
-              <a:rPr lang="en-US" dirty="0" smtClean="0"/>
-              <a:t>One Path Two Port</a:t>
-            </a:r>
-          </a:p>
-          <a:p>
-            <a:pPr lvl="1"/>
-            <a:r>
-              <a:rPr lang="en-US" dirty="0" smtClean="0"/>
-              <a:t>Source Power Cal</a:t>
-            </a:r>
-          </a:p>
-          <a:p>
-            <a:r>
-              <a:rPr lang="en-US" dirty="0" smtClean="0"/>
-              <a:t>Pulsed RF</a:t>
-            </a:r>
-          </a:p>
-          <a:p>
-            <a:pPr lvl="1"/>
-            <a:r>
-              <a:rPr lang="en-US" dirty="0" smtClean="0"/>
-              <a:t>Pulse Type: Single Pulse</a:t>
-            </a:r>
-          </a:p>
-          <a:p>
-            <a:pPr lvl="1"/>
-            <a:r>
-              <a:rPr lang="en-US" dirty="0" smtClean="0"/>
-              <a:t>Trigger: Rising Edge Pulse</a:t>
-            </a:r>
-          </a:p>
-          <a:p>
-            <a:pPr lvl="1"/>
-            <a:r>
-              <a:rPr lang="en-US" dirty="0" smtClean="0"/>
-              <a:t>Trigger measurement: Point</a:t>
-            </a:r>
-          </a:p>
-          <a:p>
-            <a:pPr lvl="1"/>
-            <a:endParaRPr lang="en-US" dirty="0" smtClean="0"/>
-          </a:p>
-          <a:p>
-            <a:endParaRPr lang="en-US" dirty="0"/>
-          </a:p>
-        </p:txBody>
-      </p:sp>
-      <p:sp>
-        <p:nvSpPr>
-          <p:cNvPr id="4" name="Slide Number Placeholder 3"/>
-          <p:cNvSpPr>
-            <a:spLocks noGrp="1"/>
-          </p:cNvSpPr>
-          <p:nvPr>
-            <p:ph type="sldNum" sz="quarter" idx="10"/>
-          </p:nvPr>
-        </p:nvSpPr>
-        <p:spPr/>
-        <p:txBody>
-          <a:bodyPr/>
-          <a:lstStyle/>
-          <a:p>
-            <a:pPr>
-              <a:defRPr/>
-            </a:pPr>
-            <a:fld id="{C2257212-E44F-4C49-9A79-F22BDE7B0592}" type="slidenum">
-              <a:rPr lang="en-US" smtClean="0"/>
-              <a:pPr>
-                <a:defRPr/>
-              </a:pPr>
-              <a:t>2</a:t>
-            </a:fld>
-            <a:endParaRPr lang="en-US" dirty="0"/>
-          </a:p>
-        </p:txBody>
-      </p:sp>
-    </p:spTree>
-    <p:extLst>
-      <p:ext uri="{BB962C8B-B14F-4D97-AF65-F5344CB8AC3E}">
-        <p14:creationId xmlns:p14="http://schemas.microsoft.com/office/powerpoint/2010/main" val="2028291349"/>
-      </p:ext>
-    </p:extLst>
-  </p:cSld>
-  <p:clrMapOvr>
-    <a:masterClrMapping/>
-  </p:clrMapOvr>
-</p:sld>
-</file>
-
-<file path=ppt/slides/slide20.xml><?xml version="1.0" encoding="utf-8"?>
+<file path=ppt/slides/slide21.xml><?xml version="1.0" encoding="utf-8"?>
 <p:sld xmlns:a="http://schemas.openxmlformats.org/drawingml/2006/main" xmlns:r="http://schemas.openxmlformats.org/officeDocument/2006/relationships" xmlns:p="http://schemas.openxmlformats.org/presentationml/2006/main">
   <p:cSld>
     <p:spTree>
@@ -14485,7 +14637,7 @@
               <a:pPr>
                 <a:defRPr/>
               </a:pPr>
-              <a:t>20</a:t>
+              <a:t>21</a:t>
             </a:fld>
             <a:endParaRPr lang="en-US" dirty="0"/>
           </a:p>
@@ -14611,7 +14763,7 @@
 </p:sld>
 </file>
 
-<file path=ppt/slides/slide21.xml><?xml version="1.0" encoding="utf-8"?>
+<file path=ppt/slides/slide22.xml><?xml version="1.0" encoding="utf-8"?>
 <p:sld xmlns:a="http://schemas.openxmlformats.org/drawingml/2006/main" xmlns:r="http://schemas.openxmlformats.org/officeDocument/2006/relationships" xmlns:p="http://schemas.openxmlformats.org/presentationml/2006/main">
   <p:cSld>
     <p:spTree>
@@ -14674,7 +14826,7 @@
               <a:pPr>
                 <a:defRPr/>
               </a:pPr>
-              <a:t>21</a:t>
+              <a:t>22</a:t>
             </a:fld>
             <a:endParaRPr lang="en-US" dirty="0"/>
           </a:p>

</xml_diff>

<commit_message>
Made small change to pulsing setup
</commit_message>
<xml_diff>
--- a/Documentation/User manual/MACOM RI Pulsed RF Application Note.pptx
+++ b/Documentation/User manual/MACOM RI Pulsed RF Application Note.pptx
@@ -36,6 +36,9 @@
   </p:sldIdLst>
   <p:sldSz cx="9144000" cy="6858000" type="screen4x3"/>
   <p:notesSz cx="7104063" cy="10234613"/>
+  <p:custDataLst>
+    <p:tags r:id="rId26"/>
+  </p:custDataLst>
   <p:defaultTextStyle>
     <a:defPPr>
       <a:defRPr lang="en-US"/>
@@ -315,7 +318,7 @@
               <a:pPr>
                 <a:defRPr/>
               </a:pPr>
-              <a:t>4/4/2016</a:t>
+              <a:t>2/13/2018</a:t>
             </a:fld>
             <a:endParaRPr lang="en-US"/>
           </a:p>
@@ -538,7 +541,7 @@
               <a:pPr>
                 <a:defRPr/>
               </a:pPr>
-              <a:t>4/4/2016</a:t>
+              <a:t>2/13/2018</a:t>
             </a:fld>
             <a:endParaRPr lang="en-US" dirty="0"/>
           </a:p>
@@ -927,14 +930,14 @@
           </a:ln>
           <a:extLst>
             <a:ext uri="{909E8E84-426E-40dd-AFC4-6F175D3DCCD1}">
-              <a14:hiddenFill xmlns:a14="http://schemas.microsoft.com/office/drawing/2010/main" xmlns="">
+              <a14:hiddenFill xmlns="" xmlns:a14="http://schemas.microsoft.com/office/drawing/2010/main">
                 <a:solidFill>
                   <a:srgbClr val="FFFFFF"/>
                 </a:solidFill>
               </a14:hiddenFill>
             </a:ext>
             <a:ext uri="{91240B29-F687-4f45-9708-019B960494DF}">
-              <a14:hiddenLine xmlns:a14="http://schemas.microsoft.com/office/drawing/2010/main" xmlns="" w="9525">
+              <a14:hiddenLine xmlns="" xmlns:a14="http://schemas.microsoft.com/office/drawing/2010/main" w="9525">
                 <a:solidFill>
                   <a:srgbClr val="000000"/>
                 </a:solidFill>
@@ -981,14 +984,14 @@
           </a:ln>
           <a:extLst>
             <a:ext uri="{909E8E84-426E-40dd-AFC4-6F175D3DCCD1}">
-              <a14:hiddenFill xmlns:a14="http://schemas.microsoft.com/office/drawing/2010/main" xmlns="">
+              <a14:hiddenFill xmlns="" xmlns:a14="http://schemas.microsoft.com/office/drawing/2010/main">
                 <a:solidFill>
                   <a:srgbClr val="FFFFFF"/>
                 </a:solidFill>
               </a14:hiddenFill>
             </a:ext>
             <a:ext uri="{91240B29-F687-4f45-9708-019B960494DF}">
-              <a14:hiddenLine xmlns:a14="http://schemas.microsoft.com/office/drawing/2010/main" xmlns="" w="9525">
+              <a14:hiddenLine xmlns="" xmlns:a14="http://schemas.microsoft.com/office/drawing/2010/main" w="9525">
                 <a:solidFill>
                   <a:srgbClr val="000000"/>
                 </a:solidFill>
@@ -4145,14 +4148,14 @@
           </a:ln>
           <a:extLst>
             <a:ext uri="{909E8E84-426E-40dd-AFC4-6F175D3DCCD1}">
-              <a14:hiddenFill xmlns:a14="http://schemas.microsoft.com/office/drawing/2010/main" xmlns="">
+              <a14:hiddenFill xmlns="" xmlns:a14="http://schemas.microsoft.com/office/drawing/2010/main">
                 <a:solidFill>
                   <a:srgbClr val="FFFFFF"/>
                 </a:solidFill>
               </a14:hiddenFill>
             </a:ext>
             <a:ext uri="{91240B29-F687-4f45-9708-019B960494DF}">
-              <a14:hiddenLine xmlns:a14="http://schemas.microsoft.com/office/drawing/2010/main" xmlns="" w="9525">
+              <a14:hiddenLine xmlns="" xmlns:a14="http://schemas.microsoft.com/office/drawing/2010/main" w="9525">
                 <a:solidFill>
                   <a:srgbClr val="000000"/>
                 </a:solidFill>
@@ -5127,14 +5130,14 @@
           </a:effectLst>
           <a:extLst>
             <a:ext uri="{909E8E84-426E-40dd-AFC4-6F175D3DCCD1}">
-              <a14:hiddenFill xmlns:a14="http://schemas.microsoft.com/office/drawing/2010/main" xmlns="">
+              <a14:hiddenFill xmlns="" xmlns:a14="http://schemas.microsoft.com/office/drawing/2010/main">
                 <a:solidFill>
                   <a:srgbClr val="FFFFFF"/>
                 </a:solidFill>
               </a14:hiddenFill>
             </a:ext>
             <a:ext uri="{91240B29-F687-4f45-9708-019B960494DF}">
-              <a14:hiddenLine xmlns:a14="http://schemas.microsoft.com/office/drawing/2010/main" xmlns="" w="9525">
+              <a14:hiddenLine xmlns="" xmlns:a14="http://schemas.microsoft.com/office/drawing/2010/main" w="9525">
                 <a:solidFill>
                   <a:srgbClr val="000000"/>
                 </a:solidFill>
@@ -5170,14 +5173,14 @@
           </a:ln>
           <a:extLst>
             <a:ext uri="{909E8E84-426E-40dd-AFC4-6F175D3DCCD1}">
-              <a14:hiddenFill xmlns:a14="http://schemas.microsoft.com/office/drawing/2010/main" xmlns="">
+              <a14:hiddenFill xmlns="" xmlns:a14="http://schemas.microsoft.com/office/drawing/2010/main">
                 <a:solidFill>
                   <a:srgbClr val="FFFFFF"/>
                 </a:solidFill>
               </a14:hiddenFill>
             </a:ext>
             <a:ext uri="{91240B29-F687-4f45-9708-019B960494DF}">
-              <a14:hiddenLine xmlns:a14="http://schemas.microsoft.com/office/drawing/2010/main" xmlns="" w="9525">
+              <a14:hiddenLine xmlns="" xmlns:a14="http://schemas.microsoft.com/office/drawing/2010/main" w="9525">
                 <a:solidFill>
                   <a:srgbClr val="000000"/>
                 </a:solidFill>
@@ -5923,7 +5926,44 @@
           </a:p>
         </p:txBody>
       </p:sp>
+      <p:sp>
+        <p:nvSpPr>
+          <p:cNvPr id="7" name="RS_Classification_Standard"/>
+          <p:cNvSpPr txBox="1"/>
+          <p:nvPr/>
+        </p:nvSpPr>
+        <p:spPr>
+          <a:xfrm>
+            <a:off x="8990047" y="6195244"/>
+            <a:ext cx="153953" cy="243656"/>
+          </a:xfrm>
+          <a:prstGeom prst="rect">
+            <a:avLst/>
+          </a:prstGeom>
+          <a:solidFill>
+            <a:srgbClr val="FFFFFF">
+              <a:alpha val="0"/>
+            </a:srgbClr>
+          </a:solidFill>
+        </p:spPr>
+        <p:txBody>
+          <a:bodyPr vert="horz" wrap="none" lIns="76200" tIns="36830" rIns="76200" bIns="36830" rtlCol="0" anchor="ctr">
+            <a:spAutoFit/>
+          </a:bodyPr>
+          <a:lstStyle/>
+          <a:p>
+            <a:endParaRPr lang="en-US" sz="1100" b="1" kern="900" spc="100">
+              <a:solidFill>
+                <a:srgbClr val="000000"/>
+              </a:solidFill>
+            </a:endParaRPr>
+          </a:p>
+        </p:txBody>
+      </p:sp>
     </p:spTree>
+    <p:custDataLst>
+      <p:tags r:id="rId1"/>
+    </p:custDataLst>
     <p:extLst>
       <p:ext uri="{BB962C8B-B14F-4D97-AF65-F5344CB8AC3E}">
         <p14:creationId xmlns:p14="http://schemas.microsoft.com/office/powerpoint/2010/main" val="1830392389"/>
@@ -6067,7 +6107,7 @@
           <p:nvPr/>
         </p:nvPicPr>
         <p:blipFill rotWithShape="1">
-          <a:blip r:embed="rId2">
+          <a:blip r:embed="rId3">
             <a:extLst>
               <a:ext uri="{28A0092B-C50C-407E-A947-70E740481C1C}">
                 <a14:useLocalDpi xmlns:a14="http://schemas.microsoft.com/office/drawing/2010/main" val="0"/>
@@ -6132,7 +6172,44 @@
           </a:fontRef>
         </p:style>
       </p:cxnSp>
+      <p:sp>
+        <p:nvSpPr>
+          <p:cNvPr id="10" name="RS_Classification_Standard"/>
+          <p:cNvSpPr txBox="1"/>
+          <p:nvPr/>
+        </p:nvSpPr>
+        <p:spPr>
+          <a:xfrm>
+            <a:off x="8990047" y="6195244"/>
+            <a:ext cx="153953" cy="243656"/>
+          </a:xfrm>
+          <a:prstGeom prst="rect">
+            <a:avLst/>
+          </a:prstGeom>
+          <a:solidFill>
+            <a:srgbClr val="FFFFFF">
+              <a:alpha val="0"/>
+            </a:srgbClr>
+          </a:solidFill>
+        </p:spPr>
+        <p:txBody>
+          <a:bodyPr vert="horz" wrap="none" lIns="76200" tIns="36830" rIns="76200" bIns="36830" rtlCol="0" anchor="ctr">
+            <a:spAutoFit/>
+          </a:bodyPr>
+          <a:lstStyle/>
+          <a:p>
+            <a:endParaRPr lang="en-US" sz="1100" b="1" kern="900" spc="100">
+              <a:solidFill>
+                <a:srgbClr val="000000"/>
+              </a:solidFill>
+            </a:endParaRPr>
+          </a:p>
+        </p:txBody>
+      </p:sp>
     </p:spTree>
+    <p:custDataLst>
+      <p:tags r:id="rId1"/>
+    </p:custDataLst>
     <p:extLst>
       <p:ext uri="{BB962C8B-B14F-4D97-AF65-F5344CB8AC3E}">
         <p14:creationId xmlns:p14="http://schemas.microsoft.com/office/powerpoint/2010/main" val="2068428088"/>
@@ -6276,7 +6353,7 @@
           <p:nvPr/>
         </p:nvPicPr>
         <p:blipFill rotWithShape="1">
-          <a:blip r:embed="rId2">
+          <a:blip r:embed="rId3">
             <a:extLst>
               <a:ext uri="{28A0092B-C50C-407E-A947-70E740481C1C}">
                 <a14:useLocalDpi xmlns:a14="http://schemas.microsoft.com/office/drawing/2010/main" val="0"/>
@@ -6308,7 +6385,44 @@
           </a:effectLst>
         </p:spPr>
       </p:pic>
+      <p:sp>
+        <p:nvSpPr>
+          <p:cNvPr id="9" name="RS_Classification_Standard"/>
+          <p:cNvSpPr txBox="1"/>
+          <p:nvPr/>
+        </p:nvSpPr>
+        <p:spPr>
+          <a:xfrm>
+            <a:off x="8990047" y="6195244"/>
+            <a:ext cx="153953" cy="243656"/>
+          </a:xfrm>
+          <a:prstGeom prst="rect">
+            <a:avLst/>
+          </a:prstGeom>
+          <a:solidFill>
+            <a:srgbClr val="FFFFFF">
+              <a:alpha val="0"/>
+            </a:srgbClr>
+          </a:solidFill>
+        </p:spPr>
+        <p:txBody>
+          <a:bodyPr vert="horz" wrap="none" lIns="76200" tIns="36830" rIns="76200" bIns="36830" rtlCol="0" anchor="ctr">
+            <a:spAutoFit/>
+          </a:bodyPr>
+          <a:lstStyle/>
+          <a:p>
+            <a:endParaRPr lang="en-US" sz="1100" b="1" kern="900" spc="100">
+              <a:solidFill>
+                <a:srgbClr val="000000"/>
+              </a:solidFill>
+            </a:endParaRPr>
+          </a:p>
+        </p:txBody>
+      </p:sp>
     </p:spTree>
+    <p:custDataLst>
+      <p:tags r:id="rId1"/>
+    </p:custDataLst>
     <p:extLst>
       <p:ext uri="{BB962C8B-B14F-4D97-AF65-F5344CB8AC3E}">
         <p14:creationId xmlns:p14="http://schemas.microsoft.com/office/powerpoint/2010/main" val="3857038538"/>
@@ -6467,7 +6581,7 @@
           <p:nvPr/>
         </p:nvPicPr>
         <p:blipFill rotWithShape="1">
-          <a:blip r:embed="rId2">
+          <a:blip r:embed="rId3">
             <a:extLst>
               <a:ext uri="{28A0092B-C50C-407E-A947-70E740481C1C}">
                 <a14:useLocalDpi xmlns:a14="http://schemas.microsoft.com/office/drawing/2010/main" val="0"/>
@@ -6532,7 +6646,44 @@
           </a:fontRef>
         </p:style>
       </p:cxnSp>
+      <p:sp>
+        <p:nvSpPr>
+          <p:cNvPr id="10" name="RS_Classification_Standard"/>
+          <p:cNvSpPr txBox="1"/>
+          <p:nvPr/>
+        </p:nvSpPr>
+        <p:spPr>
+          <a:xfrm>
+            <a:off x="8990047" y="6195244"/>
+            <a:ext cx="153953" cy="243656"/>
+          </a:xfrm>
+          <a:prstGeom prst="rect">
+            <a:avLst/>
+          </a:prstGeom>
+          <a:solidFill>
+            <a:srgbClr val="FFFFFF">
+              <a:alpha val="0"/>
+            </a:srgbClr>
+          </a:solidFill>
+        </p:spPr>
+        <p:txBody>
+          <a:bodyPr vert="horz" wrap="none" lIns="76200" tIns="36830" rIns="76200" bIns="36830" rtlCol="0" anchor="ctr">
+            <a:spAutoFit/>
+          </a:bodyPr>
+          <a:lstStyle/>
+          <a:p>
+            <a:endParaRPr lang="en-US" sz="1100" b="1" kern="900" spc="100">
+              <a:solidFill>
+                <a:srgbClr val="000000"/>
+              </a:solidFill>
+            </a:endParaRPr>
+          </a:p>
+        </p:txBody>
+      </p:sp>
     </p:spTree>
+    <p:custDataLst>
+      <p:tags r:id="rId1"/>
+    </p:custDataLst>
     <p:extLst>
       <p:ext uri="{BB962C8B-B14F-4D97-AF65-F5344CB8AC3E}">
         <p14:creationId xmlns:p14="http://schemas.microsoft.com/office/powerpoint/2010/main" val="1849112206"/>
@@ -9874,7 +10025,44 @@
           </p:txBody>
         </p:sp>
       </p:grpSp>
+      <p:sp>
+        <p:nvSpPr>
+          <p:cNvPr id="8" name="RS_Classification_Standard"/>
+          <p:cNvSpPr txBox="1"/>
+          <p:nvPr/>
+        </p:nvSpPr>
+        <p:spPr>
+          <a:xfrm>
+            <a:off x="8990047" y="6195244"/>
+            <a:ext cx="153953" cy="243656"/>
+          </a:xfrm>
+          <a:prstGeom prst="rect">
+            <a:avLst/>
+          </a:prstGeom>
+          <a:solidFill>
+            <a:srgbClr val="FFFFFF">
+              <a:alpha val="0"/>
+            </a:srgbClr>
+          </a:solidFill>
+        </p:spPr>
+        <p:txBody>
+          <a:bodyPr vert="horz" wrap="none" lIns="76200" tIns="36830" rIns="76200" bIns="36830" rtlCol="0" anchor="ctr">
+            <a:spAutoFit/>
+          </a:bodyPr>
+          <a:lstStyle/>
+          <a:p>
+            <a:endParaRPr lang="en-US" sz="1100" b="1" kern="900" spc="100">
+              <a:solidFill>
+                <a:srgbClr val="000000"/>
+              </a:solidFill>
+            </a:endParaRPr>
+          </a:p>
+        </p:txBody>
+      </p:sp>
     </p:spTree>
+    <p:custDataLst>
+      <p:tags r:id="rId1"/>
+    </p:custDataLst>
     <p:extLst>
       <p:ext uri="{BB962C8B-B14F-4D97-AF65-F5344CB8AC3E}">
         <p14:creationId xmlns:p14="http://schemas.microsoft.com/office/powerpoint/2010/main" val="69115651"/>
@@ -13162,7 +13350,44 @@
           </p:txBody>
         </p:sp>
       </p:grpSp>
+      <p:sp>
+        <p:nvSpPr>
+          <p:cNvPr id="4" name="RS_Classification_Standard"/>
+          <p:cNvSpPr txBox="1"/>
+          <p:nvPr/>
+        </p:nvSpPr>
+        <p:spPr>
+          <a:xfrm>
+            <a:off x="8990047" y="6195244"/>
+            <a:ext cx="153953" cy="243656"/>
+          </a:xfrm>
+          <a:prstGeom prst="rect">
+            <a:avLst/>
+          </a:prstGeom>
+          <a:solidFill>
+            <a:srgbClr val="FFFFFF">
+              <a:alpha val="0"/>
+            </a:srgbClr>
+          </a:solidFill>
+        </p:spPr>
+        <p:txBody>
+          <a:bodyPr vert="horz" wrap="none" lIns="76200" tIns="36830" rIns="76200" bIns="36830" rtlCol="0" anchor="ctr">
+            <a:spAutoFit/>
+          </a:bodyPr>
+          <a:lstStyle/>
+          <a:p>
+            <a:endParaRPr lang="en-US" sz="1100" b="1" kern="900" spc="100">
+              <a:solidFill>
+                <a:srgbClr val="000000"/>
+              </a:solidFill>
+            </a:endParaRPr>
+          </a:p>
+        </p:txBody>
+      </p:sp>
     </p:spTree>
+    <p:custDataLst>
+      <p:tags r:id="rId1"/>
+    </p:custDataLst>
     <p:extLst>
       <p:ext uri="{BB962C8B-B14F-4D97-AF65-F5344CB8AC3E}">
         <p14:creationId xmlns:p14="http://schemas.microsoft.com/office/powerpoint/2010/main" val="1257805634"/>
@@ -13299,7 +13524,7 @@
           <p:nvPr/>
         </p:nvPicPr>
         <p:blipFill>
-          <a:blip r:embed="rId2"/>
+          <a:blip r:embed="rId3"/>
           <a:stretch>
             <a:fillRect/>
           </a:stretch>
@@ -13359,7 +13584,44 @@
           </a:fontRef>
         </p:style>
       </p:cxnSp>
+      <p:sp>
+        <p:nvSpPr>
+          <p:cNvPr id="7" name="RS_Classification_Standard"/>
+          <p:cNvSpPr txBox="1"/>
+          <p:nvPr/>
+        </p:nvSpPr>
+        <p:spPr>
+          <a:xfrm>
+            <a:off x="8990047" y="6195244"/>
+            <a:ext cx="153953" cy="243656"/>
+          </a:xfrm>
+          <a:prstGeom prst="rect">
+            <a:avLst/>
+          </a:prstGeom>
+          <a:solidFill>
+            <a:srgbClr val="FFFFFF">
+              <a:alpha val="0"/>
+            </a:srgbClr>
+          </a:solidFill>
+        </p:spPr>
+        <p:txBody>
+          <a:bodyPr vert="horz" wrap="none" lIns="76200" tIns="36830" rIns="76200" bIns="36830" rtlCol="0" anchor="ctr">
+            <a:spAutoFit/>
+          </a:bodyPr>
+          <a:lstStyle/>
+          <a:p>
+            <a:endParaRPr lang="en-US" sz="1100" b="1" kern="900" spc="100">
+              <a:solidFill>
+                <a:srgbClr val="000000"/>
+              </a:solidFill>
+            </a:endParaRPr>
+          </a:p>
+        </p:txBody>
+      </p:sp>
     </p:spTree>
+    <p:custDataLst>
+      <p:tags r:id="rId1"/>
+    </p:custDataLst>
     <p:extLst>
       <p:ext uri="{BB962C8B-B14F-4D97-AF65-F5344CB8AC3E}">
         <p14:creationId xmlns:p14="http://schemas.microsoft.com/office/powerpoint/2010/main" val="1322036445"/>
@@ -13523,7 +13785,7 @@
           <p:nvPr/>
         </p:nvPicPr>
         <p:blipFill>
-          <a:blip r:embed="rId2"/>
+          <a:blip r:embed="rId3"/>
           <a:stretch>
             <a:fillRect/>
           </a:stretch>
@@ -13550,7 +13812,44 @@
           </a:effectLst>
         </p:spPr>
       </p:pic>
+      <p:sp>
+        <p:nvSpPr>
+          <p:cNvPr id="9" name="RS_Classification_Standard"/>
+          <p:cNvSpPr txBox="1"/>
+          <p:nvPr/>
+        </p:nvSpPr>
+        <p:spPr>
+          <a:xfrm>
+            <a:off x="8990047" y="6195244"/>
+            <a:ext cx="153953" cy="243656"/>
+          </a:xfrm>
+          <a:prstGeom prst="rect">
+            <a:avLst/>
+          </a:prstGeom>
+          <a:solidFill>
+            <a:srgbClr val="FFFFFF">
+              <a:alpha val="0"/>
+            </a:srgbClr>
+          </a:solidFill>
+        </p:spPr>
+        <p:txBody>
+          <a:bodyPr vert="horz" wrap="none" lIns="76200" tIns="36830" rIns="76200" bIns="36830" rtlCol="0" anchor="ctr">
+            <a:spAutoFit/>
+          </a:bodyPr>
+          <a:lstStyle/>
+          <a:p>
+            <a:endParaRPr lang="en-US" sz="1100" b="1" kern="900" spc="100">
+              <a:solidFill>
+                <a:srgbClr val="000000"/>
+              </a:solidFill>
+            </a:endParaRPr>
+          </a:p>
+        </p:txBody>
+      </p:sp>
     </p:spTree>
+    <p:custDataLst>
+      <p:tags r:id="rId1"/>
+    </p:custDataLst>
     <p:extLst>
       <p:ext uri="{BB962C8B-B14F-4D97-AF65-F5344CB8AC3E}">
         <p14:creationId xmlns:p14="http://schemas.microsoft.com/office/powerpoint/2010/main" val="3077676270"/>
@@ -13708,7 +14007,7 @@
           <p:nvPr/>
         </p:nvPicPr>
         <p:blipFill>
-          <a:blip r:embed="rId2"/>
+          <a:blip r:embed="rId3"/>
           <a:stretch>
             <a:fillRect/>
           </a:stretch>
@@ -13801,7 +14100,44 @@
           </a:fontRef>
         </p:style>
       </p:cxnSp>
+      <p:sp>
+        <p:nvSpPr>
+          <p:cNvPr id="11" name="RS_Classification_Standard"/>
+          <p:cNvSpPr txBox="1"/>
+          <p:nvPr/>
+        </p:nvSpPr>
+        <p:spPr>
+          <a:xfrm>
+            <a:off x="8990047" y="6195244"/>
+            <a:ext cx="153953" cy="243656"/>
+          </a:xfrm>
+          <a:prstGeom prst="rect">
+            <a:avLst/>
+          </a:prstGeom>
+          <a:solidFill>
+            <a:srgbClr val="FFFFFF">
+              <a:alpha val="0"/>
+            </a:srgbClr>
+          </a:solidFill>
+        </p:spPr>
+        <p:txBody>
+          <a:bodyPr vert="horz" wrap="none" lIns="76200" tIns="36830" rIns="76200" bIns="36830" rtlCol="0" anchor="ctr">
+            <a:spAutoFit/>
+          </a:bodyPr>
+          <a:lstStyle/>
+          <a:p>
+            <a:endParaRPr lang="en-US" sz="1100" b="1" kern="900" spc="100">
+              <a:solidFill>
+                <a:srgbClr val="000000"/>
+              </a:solidFill>
+            </a:endParaRPr>
+          </a:p>
+        </p:txBody>
+      </p:sp>
     </p:spTree>
+    <p:custDataLst>
+      <p:tags r:id="rId1"/>
+    </p:custDataLst>
     <p:extLst>
       <p:ext uri="{BB962C8B-B14F-4D97-AF65-F5344CB8AC3E}">
         <p14:creationId xmlns:p14="http://schemas.microsoft.com/office/powerpoint/2010/main" val="314521427"/>
@@ -13926,7 +14262,7 @@
           <p:nvPr/>
         </p:nvPicPr>
         <p:blipFill rotWithShape="1">
-          <a:blip r:embed="rId2">
+          <a:blip r:embed="rId3">
             <a:extLst>
               <a:ext uri="{28A0092B-C50C-407E-A947-70E740481C1C}">
                 <a14:useLocalDpi xmlns:a14="http://schemas.microsoft.com/office/drawing/2010/main" val="0"/>
@@ -13991,7 +14327,44 @@
           </a:fontRef>
         </p:style>
       </p:cxnSp>
+      <p:sp>
+        <p:nvSpPr>
+          <p:cNvPr id="8" name="RS_Classification_Standard"/>
+          <p:cNvSpPr txBox="1"/>
+          <p:nvPr/>
+        </p:nvSpPr>
+        <p:spPr>
+          <a:xfrm>
+            <a:off x="8990047" y="6195244"/>
+            <a:ext cx="153953" cy="243656"/>
+          </a:xfrm>
+          <a:prstGeom prst="rect">
+            <a:avLst/>
+          </a:prstGeom>
+          <a:solidFill>
+            <a:srgbClr val="FFFFFF">
+              <a:alpha val="0"/>
+            </a:srgbClr>
+          </a:solidFill>
+        </p:spPr>
+        <p:txBody>
+          <a:bodyPr vert="horz" wrap="none" lIns="76200" tIns="36830" rIns="76200" bIns="36830" rtlCol="0" anchor="ctr">
+            <a:spAutoFit/>
+          </a:bodyPr>
+          <a:lstStyle/>
+          <a:p>
+            <a:endParaRPr lang="en-US" sz="1100" b="1" kern="900" spc="100">
+              <a:solidFill>
+                <a:srgbClr val="000000"/>
+              </a:solidFill>
+            </a:endParaRPr>
+          </a:p>
+        </p:txBody>
+      </p:sp>
     </p:spTree>
+    <p:custDataLst>
+      <p:tags r:id="rId1"/>
+    </p:custDataLst>
     <p:extLst>
       <p:ext uri="{BB962C8B-B14F-4D97-AF65-F5344CB8AC3E}">
         <p14:creationId xmlns:p14="http://schemas.microsoft.com/office/powerpoint/2010/main" val="891410045"/>
@@ -14120,7 +14493,7 @@
           <p:nvPr/>
         </p:nvPicPr>
         <p:blipFill>
-          <a:blip r:embed="rId2"/>
+          <a:blip r:embed="rId3"/>
           <a:stretch>
             <a:fillRect/>
           </a:stretch>
@@ -14147,7 +14520,44 @@
           </a:effectLst>
         </p:spPr>
       </p:pic>
+      <p:sp>
+        <p:nvSpPr>
+          <p:cNvPr id="8" name="RS_Classification_Standard"/>
+          <p:cNvSpPr txBox="1"/>
+          <p:nvPr/>
+        </p:nvSpPr>
+        <p:spPr>
+          <a:xfrm>
+            <a:off x="8990047" y="6195244"/>
+            <a:ext cx="153953" cy="243656"/>
+          </a:xfrm>
+          <a:prstGeom prst="rect">
+            <a:avLst/>
+          </a:prstGeom>
+          <a:solidFill>
+            <a:srgbClr val="FFFFFF">
+              <a:alpha val="0"/>
+            </a:srgbClr>
+          </a:solidFill>
+        </p:spPr>
+        <p:txBody>
+          <a:bodyPr vert="horz" wrap="none" lIns="76200" tIns="36830" rIns="76200" bIns="36830" rtlCol="0" anchor="ctr">
+            <a:spAutoFit/>
+          </a:bodyPr>
+          <a:lstStyle/>
+          <a:p>
+            <a:endParaRPr lang="en-US" sz="1100" b="1" kern="900" spc="100">
+              <a:solidFill>
+                <a:srgbClr val="000000"/>
+              </a:solidFill>
+            </a:endParaRPr>
+          </a:p>
+        </p:txBody>
+      </p:sp>
     </p:spTree>
+    <p:custDataLst>
+      <p:tags r:id="rId1"/>
+    </p:custDataLst>
     <p:extLst>
       <p:ext uri="{BB962C8B-B14F-4D97-AF65-F5344CB8AC3E}">
         <p14:creationId xmlns:p14="http://schemas.microsoft.com/office/powerpoint/2010/main" val="220701266"/>
@@ -14327,7 +14737,44 @@
           </a:p>
         </p:txBody>
       </p:sp>
+      <p:sp>
+        <p:nvSpPr>
+          <p:cNvPr id="7" name="RS_Classification_Standard"/>
+          <p:cNvSpPr txBox="1"/>
+          <p:nvPr/>
+        </p:nvSpPr>
+        <p:spPr>
+          <a:xfrm>
+            <a:off x="8990047" y="6195244"/>
+            <a:ext cx="153953" cy="243656"/>
+          </a:xfrm>
+          <a:prstGeom prst="rect">
+            <a:avLst/>
+          </a:prstGeom>
+          <a:solidFill>
+            <a:srgbClr val="FFFFFF">
+              <a:alpha val="0"/>
+            </a:srgbClr>
+          </a:solidFill>
+        </p:spPr>
+        <p:txBody>
+          <a:bodyPr vert="horz" wrap="none" lIns="76200" tIns="36830" rIns="76200" bIns="36830" rtlCol="0" anchor="ctr">
+            <a:spAutoFit/>
+          </a:bodyPr>
+          <a:lstStyle/>
+          <a:p>
+            <a:endParaRPr lang="en-US" sz="1100" b="1" kern="900" spc="100">
+              <a:solidFill>
+                <a:srgbClr val="000000"/>
+              </a:solidFill>
+            </a:endParaRPr>
+          </a:p>
+        </p:txBody>
+      </p:sp>
     </p:spTree>
+    <p:custDataLst>
+      <p:tags r:id="rId1"/>
+    </p:custDataLst>
     <p:extLst>
       <p:ext uri="{BB962C8B-B14F-4D97-AF65-F5344CB8AC3E}">
         <p14:creationId xmlns:p14="http://schemas.microsoft.com/office/powerpoint/2010/main" val="2028291349"/>
@@ -14485,7 +14932,7 @@
           <p:nvPr/>
         </p:nvPicPr>
         <p:blipFill rotWithShape="1">
-          <a:blip r:embed="rId2">
+          <a:blip r:embed="rId3">
             <a:extLst>
               <a:ext uri="{28A0092B-C50C-407E-A947-70E740481C1C}">
                 <a14:useLocalDpi xmlns:a14="http://schemas.microsoft.com/office/drawing/2010/main" val="0"/>
@@ -14517,7 +14964,44 @@
           </a:effectLst>
         </p:spPr>
       </p:pic>
+      <p:sp>
+        <p:nvSpPr>
+          <p:cNvPr id="8" name="RS_Classification_Standard"/>
+          <p:cNvSpPr txBox="1"/>
+          <p:nvPr/>
+        </p:nvSpPr>
+        <p:spPr>
+          <a:xfrm>
+            <a:off x="8990047" y="6195244"/>
+            <a:ext cx="153953" cy="243656"/>
+          </a:xfrm>
+          <a:prstGeom prst="rect">
+            <a:avLst/>
+          </a:prstGeom>
+          <a:solidFill>
+            <a:srgbClr val="FFFFFF">
+              <a:alpha val="0"/>
+            </a:srgbClr>
+          </a:solidFill>
+        </p:spPr>
+        <p:txBody>
+          <a:bodyPr vert="horz" wrap="none" lIns="76200" tIns="36830" rIns="76200" bIns="36830" rtlCol="0" anchor="ctr">
+            <a:spAutoFit/>
+          </a:bodyPr>
+          <a:lstStyle/>
+          <a:p>
+            <a:endParaRPr lang="en-US" sz="1100" b="1" kern="900" spc="100">
+              <a:solidFill>
+                <a:srgbClr val="000000"/>
+              </a:solidFill>
+            </a:endParaRPr>
+          </a:p>
+        </p:txBody>
+      </p:sp>
     </p:spTree>
+    <p:custDataLst>
+      <p:tags r:id="rId1"/>
+    </p:custDataLst>
     <p:extLst>
       <p:ext uri="{BB962C8B-B14F-4D97-AF65-F5344CB8AC3E}">
         <p14:creationId xmlns:p14="http://schemas.microsoft.com/office/powerpoint/2010/main" val="2894800961"/>
@@ -14685,7 +15169,7 @@
           <p:nvPr/>
         </p:nvPicPr>
         <p:blipFill rotWithShape="1">
-          <a:blip r:embed="rId2">
+          <a:blip r:embed="rId3">
             <a:extLst>
               <a:ext uri="{28A0092B-C50C-407E-A947-70E740481C1C}">
                 <a14:useLocalDpi xmlns:a14="http://schemas.microsoft.com/office/drawing/2010/main" val="0"/>
@@ -14750,7 +15234,44 @@
           </a:fontRef>
         </p:style>
       </p:cxnSp>
+      <p:sp>
+        <p:nvSpPr>
+          <p:cNvPr id="9" name="RS_Classification_Standard"/>
+          <p:cNvSpPr txBox="1"/>
+          <p:nvPr/>
+        </p:nvSpPr>
+        <p:spPr>
+          <a:xfrm>
+            <a:off x="8990047" y="6195244"/>
+            <a:ext cx="153953" cy="243656"/>
+          </a:xfrm>
+          <a:prstGeom prst="rect">
+            <a:avLst/>
+          </a:prstGeom>
+          <a:solidFill>
+            <a:srgbClr val="FFFFFF">
+              <a:alpha val="0"/>
+            </a:srgbClr>
+          </a:solidFill>
+        </p:spPr>
+        <p:txBody>
+          <a:bodyPr vert="horz" wrap="none" lIns="76200" tIns="36830" rIns="76200" bIns="36830" rtlCol="0" anchor="ctr">
+            <a:spAutoFit/>
+          </a:bodyPr>
+          <a:lstStyle/>
+          <a:p>
+            <a:endParaRPr lang="en-US" sz="1100" b="1" kern="900" spc="100">
+              <a:solidFill>
+                <a:srgbClr val="000000"/>
+              </a:solidFill>
+            </a:endParaRPr>
+          </a:p>
+        </p:txBody>
+      </p:sp>
     </p:spTree>
+    <p:custDataLst>
+      <p:tags r:id="rId1"/>
+    </p:custDataLst>
     <p:extLst>
       <p:ext uri="{BB962C8B-B14F-4D97-AF65-F5344CB8AC3E}">
         <p14:creationId xmlns:p14="http://schemas.microsoft.com/office/powerpoint/2010/main" val="3551745595"/>
@@ -14997,7 +15518,7 @@
               <a:rPr lang="en-US" dirty="0" smtClean="0">
                 <a:latin typeface="Courier New" pitchFamily="49" charset="0"/>
                 <a:cs typeface="Courier New" pitchFamily="49" charset="0"/>
-                <a:hlinkClick r:id="rId2"/>
+                <a:hlinkClick r:id="rId3"/>
               </a:rPr>
               <a:t>nick.lalic@rsa.rohde-schwarz.com</a:t>
             </a:r>
@@ -15021,7 +15542,7 @@
               <a:rPr lang="en-US" dirty="0" smtClean="0">
                 <a:latin typeface="Courier New" pitchFamily="49" charset="0"/>
                 <a:cs typeface="Courier New" pitchFamily="49" charset="0"/>
-                <a:hlinkClick r:id="rId3"/>
+                <a:hlinkClick r:id="rId4"/>
               </a:rPr>
               <a:t>http://vna.rs-us.net</a:t>
             </a:r>
@@ -15187,7 +15708,7 @@
               <a:rPr lang="en-US" dirty="0" smtClean="0">
                 <a:latin typeface="Courier New" pitchFamily="49" charset="0"/>
                 <a:cs typeface="Courier New" pitchFamily="49" charset="0"/>
-                <a:hlinkClick r:id="rId4"/>
+                <a:hlinkClick r:id="rId5"/>
               </a:rPr>
               <a:t>greg.bonaguide@rsa.rohde-Schwarz.com</a:t>
             </a:r>
@@ -15243,7 +15764,44 @@
           </a:p>
         </p:txBody>
       </p:sp>
+      <p:sp>
+        <p:nvSpPr>
+          <p:cNvPr id="9" name="RS_Classification_Standard"/>
+          <p:cNvSpPr txBox="1"/>
+          <p:nvPr/>
+        </p:nvSpPr>
+        <p:spPr>
+          <a:xfrm>
+            <a:off x="8990047" y="6195244"/>
+            <a:ext cx="153953" cy="243656"/>
+          </a:xfrm>
+          <a:prstGeom prst="rect">
+            <a:avLst/>
+          </a:prstGeom>
+          <a:solidFill>
+            <a:srgbClr val="FFFFFF">
+              <a:alpha val="0"/>
+            </a:srgbClr>
+          </a:solidFill>
+        </p:spPr>
+        <p:txBody>
+          <a:bodyPr vert="horz" wrap="none" lIns="76200" tIns="36830" rIns="76200" bIns="36830" rtlCol="0" anchor="ctr">
+            <a:spAutoFit/>
+          </a:bodyPr>
+          <a:lstStyle/>
+          <a:p>
+            <a:endParaRPr lang="en-US" sz="1100" b="1" kern="900" spc="100">
+              <a:solidFill>
+                <a:srgbClr val="000000"/>
+              </a:solidFill>
+            </a:endParaRPr>
+          </a:p>
+        </p:txBody>
+      </p:sp>
     </p:spTree>
+    <p:custDataLst>
+      <p:tags r:id="rId1"/>
+    </p:custDataLst>
     <p:extLst>
       <p:ext uri="{BB962C8B-B14F-4D97-AF65-F5344CB8AC3E}">
         <p14:creationId xmlns:p14="http://schemas.microsoft.com/office/powerpoint/2010/main" val="141620503"/>
@@ -18650,7 +19208,44 @@
           </p:txBody>
         </p:sp>
       </p:grpSp>
+      <p:sp>
+        <p:nvSpPr>
+          <p:cNvPr id="20" name="RS_Classification_Standard"/>
+          <p:cNvSpPr txBox="1"/>
+          <p:nvPr/>
+        </p:nvSpPr>
+        <p:spPr>
+          <a:xfrm>
+            <a:off x="8990047" y="6195244"/>
+            <a:ext cx="153953" cy="243656"/>
+          </a:xfrm>
+          <a:prstGeom prst="rect">
+            <a:avLst/>
+          </a:prstGeom>
+          <a:solidFill>
+            <a:srgbClr val="FFFFFF">
+              <a:alpha val="0"/>
+            </a:srgbClr>
+          </a:solidFill>
+        </p:spPr>
+        <p:txBody>
+          <a:bodyPr vert="horz" wrap="none" lIns="76200" tIns="36830" rIns="76200" bIns="36830" rtlCol="0" anchor="ctr">
+            <a:spAutoFit/>
+          </a:bodyPr>
+          <a:lstStyle/>
+          <a:p>
+            <a:endParaRPr lang="en-US" sz="1100" b="1" kern="900" spc="100">
+              <a:solidFill>
+                <a:srgbClr val="000000"/>
+              </a:solidFill>
+            </a:endParaRPr>
+          </a:p>
+        </p:txBody>
+      </p:sp>
     </p:spTree>
+    <p:custDataLst>
+      <p:tags r:id="rId1"/>
+    </p:custDataLst>
     <p:extLst>
       <p:ext uri="{BB962C8B-B14F-4D97-AF65-F5344CB8AC3E}">
         <p14:creationId xmlns:p14="http://schemas.microsoft.com/office/powerpoint/2010/main" val="2243468172"/>
@@ -18800,7 +19395,7 @@
           <p:nvPr/>
         </p:nvPicPr>
         <p:blipFill>
-          <a:blip r:embed="rId2">
+          <a:blip r:embed="rId3">
             <a:extLst>
               <a:ext uri="{28A0092B-C50C-407E-A947-70E740481C1C}">
                 <a14:useLocalDpi xmlns:a14="http://schemas.microsoft.com/office/drawing/2010/main" val="0"/>
@@ -18833,7 +19428,44 @@
           </a:effectLst>
         </p:spPr>
       </p:pic>
+      <p:sp>
+        <p:nvSpPr>
+          <p:cNvPr id="9" name="RS_Classification_Standard"/>
+          <p:cNvSpPr txBox="1"/>
+          <p:nvPr/>
+        </p:nvSpPr>
+        <p:spPr>
+          <a:xfrm>
+            <a:off x="8990047" y="6195244"/>
+            <a:ext cx="153953" cy="243656"/>
+          </a:xfrm>
+          <a:prstGeom prst="rect">
+            <a:avLst/>
+          </a:prstGeom>
+          <a:solidFill>
+            <a:srgbClr val="FFFFFF">
+              <a:alpha val="0"/>
+            </a:srgbClr>
+          </a:solidFill>
+        </p:spPr>
+        <p:txBody>
+          <a:bodyPr vert="horz" wrap="none" lIns="76200" tIns="36830" rIns="76200" bIns="36830" rtlCol="0" anchor="ctr">
+            <a:spAutoFit/>
+          </a:bodyPr>
+          <a:lstStyle/>
+          <a:p>
+            <a:endParaRPr lang="en-US" sz="1100" b="1" kern="900" spc="100">
+              <a:solidFill>
+                <a:srgbClr val="000000"/>
+              </a:solidFill>
+            </a:endParaRPr>
+          </a:p>
+        </p:txBody>
+      </p:sp>
     </p:spTree>
+    <p:custDataLst>
+      <p:tags r:id="rId1"/>
+    </p:custDataLst>
     <p:extLst>
       <p:ext uri="{BB962C8B-B14F-4D97-AF65-F5344CB8AC3E}">
         <p14:creationId xmlns:p14="http://schemas.microsoft.com/office/powerpoint/2010/main" val="2444093866"/>
@@ -18949,7 +19581,7 @@
           </p:nvPr>
         </p:nvPicPr>
         <p:blipFill rotWithShape="1">
-          <a:blip r:embed="rId2" cstate="print">
+          <a:blip r:embed="rId3" cstate="print">
             <a:extLst>
               <a:ext uri="{28A0092B-C50C-407E-A947-70E740481C1C}">
                 <a14:useLocalDpi xmlns:a14="http://schemas.microsoft.com/office/drawing/2010/main" val="0"/>
@@ -18987,7 +19619,7 @@
           <p:nvPr/>
         </p:nvPicPr>
         <p:blipFill rotWithShape="1">
-          <a:blip r:embed="rId3" cstate="print">
+          <a:blip r:embed="rId4" cstate="print">
             <a:extLst>
               <a:ext uri="{28A0092B-C50C-407E-A947-70E740481C1C}">
                 <a14:useLocalDpi xmlns:a14="http://schemas.microsoft.com/office/drawing/2010/main" val="0"/>
@@ -19237,7 +19869,44 @@
           </a:p>
         </p:txBody>
       </p:sp>
+      <p:sp>
+        <p:nvSpPr>
+          <p:cNvPr id="7" name="RS_Classification_Standard"/>
+          <p:cNvSpPr txBox="1"/>
+          <p:nvPr/>
+        </p:nvSpPr>
+        <p:spPr>
+          <a:xfrm>
+            <a:off x="8990047" y="6195244"/>
+            <a:ext cx="153953" cy="243656"/>
+          </a:xfrm>
+          <a:prstGeom prst="rect">
+            <a:avLst/>
+          </a:prstGeom>
+          <a:solidFill>
+            <a:srgbClr val="FFFFFF">
+              <a:alpha val="0"/>
+            </a:srgbClr>
+          </a:solidFill>
+        </p:spPr>
+        <p:txBody>
+          <a:bodyPr vert="horz" wrap="none" lIns="76200" tIns="36830" rIns="76200" bIns="36830" rtlCol="0" anchor="ctr">
+            <a:spAutoFit/>
+          </a:bodyPr>
+          <a:lstStyle/>
+          <a:p>
+            <a:endParaRPr lang="en-US" sz="1100" b="1" kern="900" spc="100">
+              <a:solidFill>
+                <a:srgbClr val="000000"/>
+              </a:solidFill>
+            </a:endParaRPr>
+          </a:p>
+        </p:txBody>
+      </p:sp>
     </p:spTree>
+    <p:custDataLst>
+      <p:tags r:id="rId1"/>
+    </p:custDataLst>
     <p:extLst>
       <p:ext uri="{BB962C8B-B14F-4D97-AF65-F5344CB8AC3E}">
         <p14:creationId xmlns:p14="http://schemas.microsoft.com/office/powerpoint/2010/main" val="595651560"/>
@@ -19276,7 +19945,7 @@
           <p:nvPr/>
         </p:nvPicPr>
         <p:blipFill>
-          <a:blip r:embed="rId2">
+          <a:blip r:embed="rId3">
             <a:extLst>
               <a:ext uri="{28A0092B-C50C-407E-A947-70E740481C1C}">
                 <a14:useLocalDpi xmlns:a14="http://schemas.microsoft.com/office/drawing/2010/main" val="0"/>
@@ -19313,7 +19982,7 @@
           <p:nvPr/>
         </p:nvPicPr>
         <p:blipFill>
-          <a:blip r:embed="rId3">
+          <a:blip r:embed="rId4">
             <a:extLst>
               <a:ext uri="{28A0092B-C50C-407E-A947-70E740481C1C}">
                 <a14:useLocalDpi xmlns:a14="http://schemas.microsoft.com/office/drawing/2010/main" val="0"/>
@@ -19352,7 +20021,7 @@
           </p:nvPr>
         </p:nvPicPr>
         <p:blipFill>
-          <a:blip r:embed="rId4">
+          <a:blip r:embed="rId5">
             <a:extLst>
               <a:ext uri="{28A0092B-C50C-407E-A947-70E740481C1C}">
                 <a14:useLocalDpi xmlns:a14="http://schemas.microsoft.com/office/drawing/2010/main" val="0"/>
@@ -21773,7 +22442,44 @@
           </a:p>
         </p:txBody>
       </p:sp>
+      <p:sp>
+        <p:nvSpPr>
+          <p:cNvPr id="7" name="RS_Classification_Standard"/>
+          <p:cNvSpPr txBox="1"/>
+          <p:nvPr/>
+        </p:nvSpPr>
+        <p:spPr>
+          <a:xfrm>
+            <a:off x="8990047" y="6195244"/>
+            <a:ext cx="153953" cy="243656"/>
+          </a:xfrm>
+          <a:prstGeom prst="rect">
+            <a:avLst/>
+          </a:prstGeom>
+          <a:solidFill>
+            <a:srgbClr val="FFFFFF">
+              <a:alpha val="0"/>
+            </a:srgbClr>
+          </a:solidFill>
+        </p:spPr>
+        <p:txBody>
+          <a:bodyPr vert="horz" wrap="none" lIns="76200" tIns="36830" rIns="76200" bIns="36830" rtlCol="0" anchor="ctr">
+            <a:spAutoFit/>
+          </a:bodyPr>
+          <a:lstStyle/>
+          <a:p>
+            <a:endParaRPr lang="en-US" sz="1100" b="1" kern="900" spc="100">
+              <a:solidFill>
+                <a:srgbClr val="000000"/>
+              </a:solidFill>
+            </a:endParaRPr>
+          </a:p>
+        </p:txBody>
+      </p:sp>
     </p:spTree>
+    <p:custDataLst>
+      <p:tags r:id="rId1"/>
+    </p:custDataLst>
     <p:extLst>
       <p:ext uri="{BB962C8B-B14F-4D97-AF65-F5344CB8AC3E}">
         <p14:creationId xmlns:p14="http://schemas.microsoft.com/office/powerpoint/2010/main" val="4042515520"/>
@@ -21940,7 +22646,7 @@
           <p:nvPr/>
         </p:nvPicPr>
         <p:blipFill>
-          <a:blip r:embed="rId2">
+          <a:blip r:embed="rId3">
             <a:extLst>
               <a:ext uri="{28A0092B-C50C-407E-A947-70E740481C1C}">
                 <a14:useLocalDpi xmlns:a14="http://schemas.microsoft.com/office/drawing/2010/main" val="0"/>
@@ -22001,7 +22707,44 @@
           </a:fontRef>
         </p:style>
       </p:cxnSp>
+      <p:sp>
+        <p:nvSpPr>
+          <p:cNvPr id="10" name="RS_Classification_Standard"/>
+          <p:cNvSpPr txBox="1"/>
+          <p:nvPr/>
+        </p:nvSpPr>
+        <p:spPr>
+          <a:xfrm>
+            <a:off x="8990047" y="6195244"/>
+            <a:ext cx="153953" cy="243656"/>
+          </a:xfrm>
+          <a:prstGeom prst="rect">
+            <a:avLst/>
+          </a:prstGeom>
+          <a:solidFill>
+            <a:srgbClr val="FFFFFF">
+              <a:alpha val="0"/>
+            </a:srgbClr>
+          </a:solidFill>
+        </p:spPr>
+        <p:txBody>
+          <a:bodyPr vert="horz" wrap="none" lIns="76200" tIns="36830" rIns="76200" bIns="36830" rtlCol="0" anchor="ctr">
+            <a:spAutoFit/>
+          </a:bodyPr>
+          <a:lstStyle/>
+          <a:p>
+            <a:endParaRPr lang="en-US" sz="1100" b="1" kern="900" spc="100">
+              <a:solidFill>
+                <a:srgbClr val="000000"/>
+              </a:solidFill>
+            </a:endParaRPr>
+          </a:p>
+        </p:txBody>
+      </p:sp>
     </p:spTree>
+    <p:custDataLst>
+      <p:tags r:id="rId1"/>
+    </p:custDataLst>
     <p:extLst>
       <p:ext uri="{BB962C8B-B14F-4D97-AF65-F5344CB8AC3E}">
         <p14:creationId xmlns:p14="http://schemas.microsoft.com/office/powerpoint/2010/main" val="592639328"/>
@@ -22151,7 +22894,7 @@
           <p:nvPr/>
         </p:nvPicPr>
         <p:blipFill>
-          <a:blip r:embed="rId2">
+          <a:blip r:embed="rId3">
             <a:extLst>
               <a:ext uri="{28A0092B-C50C-407E-A947-70E740481C1C}">
                 <a14:useLocalDpi xmlns:a14="http://schemas.microsoft.com/office/drawing/2010/main" val="0"/>
@@ -22263,7 +23006,44 @@
           </a:p>
         </p:txBody>
       </p:sp>
+      <p:sp>
+        <p:nvSpPr>
+          <p:cNvPr id="11" name="RS_Classification_Standard"/>
+          <p:cNvSpPr txBox="1"/>
+          <p:nvPr/>
+        </p:nvSpPr>
+        <p:spPr>
+          <a:xfrm>
+            <a:off x="8990047" y="6195244"/>
+            <a:ext cx="153953" cy="243656"/>
+          </a:xfrm>
+          <a:prstGeom prst="rect">
+            <a:avLst/>
+          </a:prstGeom>
+          <a:solidFill>
+            <a:srgbClr val="FFFFFF">
+              <a:alpha val="0"/>
+            </a:srgbClr>
+          </a:solidFill>
+        </p:spPr>
+        <p:txBody>
+          <a:bodyPr vert="horz" wrap="none" lIns="76200" tIns="36830" rIns="76200" bIns="36830" rtlCol="0" anchor="ctr">
+            <a:spAutoFit/>
+          </a:bodyPr>
+          <a:lstStyle/>
+          <a:p>
+            <a:endParaRPr lang="en-US" sz="1100" b="1" kern="900" spc="100">
+              <a:solidFill>
+                <a:srgbClr val="000000"/>
+              </a:solidFill>
+            </a:endParaRPr>
+          </a:p>
+        </p:txBody>
+      </p:sp>
     </p:spTree>
+    <p:custDataLst>
+      <p:tags r:id="rId1"/>
+    </p:custDataLst>
     <p:extLst>
       <p:ext uri="{BB962C8B-B14F-4D97-AF65-F5344CB8AC3E}">
         <p14:creationId xmlns:p14="http://schemas.microsoft.com/office/powerpoint/2010/main" val="784576336"/>
@@ -22407,7 +23187,7 @@
           <p:nvPr/>
         </p:nvPicPr>
         <p:blipFill rotWithShape="1">
-          <a:blip r:embed="rId2">
+          <a:blip r:embed="rId3">
             <a:extLst>
               <a:ext uri="{28A0092B-C50C-407E-A947-70E740481C1C}">
                 <a14:useLocalDpi xmlns:a14="http://schemas.microsoft.com/office/drawing/2010/main" val="0"/>
@@ -22472,7 +23252,44 @@
           </a:fontRef>
         </p:style>
       </p:cxnSp>
+      <p:sp>
+        <p:nvSpPr>
+          <p:cNvPr id="10" name="RS_Classification_Standard"/>
+          <p:cNvSpPr txBox="1"/>
+          <p:nvPr/>
+        </p:nvSpPr>
+        <p:spPr>
+          <a:xfrm>
+            <a:off x="8990047" y="6195244"/>
+            <a:ext cx="153953" cy="243656"/>
+          </a:xfrm>
+          <a:prstGeom prst="rect">
+            <a:avLst/>
+          </a:prstGeom>
+          <a:solidFill>
+            <a:srgbClr val="FFFFFF">
+              <a:alpha val="0"/>
+            </a:srgbClr>
+          </a:solidFill>
+        </p:spPr>
+        <p:txBody>
+          <a:bodyPr vert="horz" wrap="none" lIns="76200" tIns="36830" rIns="76200" bIns="36830" rtlCol="0" anchor="ctr">
+            <a:spAutoFit/>
+          </a:bodyPr>
+          <a:lstStyle/>
+          <a:p>
+            <a:endParaRPr lang="en-US" sz="1100" b="1" kern="900" spc="100">
+              <a:solidFill>
+                <a:srgbClr val="000000"/>
+              </a:solidFill>
+            </a:endParaRPr>
+          </a:p>
+        </p:txBody>
+      </p:sp>
     </p:spTree>
+    <p:custDataLst>
+      <p:tags r:id="rId1"/>
+    </p:custDataLst>
     <p:extLst>
       <p:ext uri="{BB962C8B-B14F-4D97-AF65-F5344CB8AC3E}">
         <p14:creationId xmlns:p14="http://schemas.microsoft.com/office/powerpoint/2010/main" val="2588909542"/>
@@ -22490,6 +23307,166 @@
     </p:tnLst>
   </p:timing>
 </p:sld>
+</file>
+
+<file path=ppt/tags/tag1.xml><?xml version="1.0" encoding="utf-8"?>
+<p:tagLst xmlns:a="http://schemas.openxmlformats.org/drawingml/2006/main" xmlns:r="http://schemas.openxmlformats.org/officeDocument/2006/relationships" xmlns:p="http://schemas.openxmlformats.org/presentationml/2006/main">
+  <p:tag name="RS_CLASSIFICATION_RESETFORMATTING" val="True"/>
+</p:tagLst>
+</file>
+
+<file path=ppt/tags/tag10.xml><?xml version="1.0" encoding="utf-8"?>
+<p:tagLst xmlns:a="http://schemas.openxmlformats.org/drawingml/2006/main" xmlns:r="http://schemas.openxmlformats.org/officeDocument/2006/relationships" xmlns:p="http://schemas.openxmlformats.org/presentationml/2006/main">
+  <p:tag name="RS_CLASSIFICATIONID" val="0"/>
+  <p:tag name="RS_CLASSIFICATION" val="UNRESTRICTED"/>
+</p:tagLst>
+</file>
+
+<file path=ppt/tags/tag11.xml><?xml version="1.0" encoding="utf-8"?>
+<p:tagLst xmlns:a="http://schemas.openxmlformats.org/drawingml/2006/main" xmlns:r="http://schemas.openxmlformats.org/officeDocument/2006/relationships" xmlns:p="http://schemas.openxmlformats.org/presentationml/2006/main">
+  <p:tag name="RS_CLASSIFICATIONID" val="0"/>
+  <p:tag name="RS_CLASSIFICATION" val="UNRESTRICTED"/>
+</p:tagLst>
+</file>
+
+<file path=ppt/tags/tag12.xml><?xml version="1.0" encoding="utf-8"?>
+<p:tagLst xmlns:a="http://schemas.openxmlformats.org/drawingml/2006/main" xmlns:r="http://schemas.openxmlformats.org/officeDocument/2006/relationships" xmlns:p="http://schemas.openxmlformats.org/presentationml/2006/main">
+  <p:tag name="RS_CLASSIFICATIONID" val="0"/>
+  <p:tag name="RS_CLASSIFICATION" val="UNRESTRICTED"/>
+</p:tagLst>
+</file>
+
+<file path=ppt/tags/tag13.xml><?xml version="1.0" encoding="utf-8"?>
+<p:tagLst xmlns:a="http://schemas.openxmlformats.org/drawingml/2006/main" xmlns:r="http://schemas.openxmlformats.org/officeDocument/2006/relationships" xmlns:p="http://schemas.openxmlformats.org/presentationml/2006/main">
+  <p:tag name="RS_CLASSIFICATIONID" val="0"/>
+  <p:tag name="RS_CLASSIFICATION" val="UNRESTRICTED"/>
+</p:tagLst>
+</file>
+
+<file path=ppt/tags/tag14.xml><?xml version="1.0" encoding="utf-8"?>
+<p:tagLst xmlns:a="http://schemas.openxmlformats.org/drawingml/2006/main" xmlns:r="http://schemas.openxmlformats.org/officeDocument/2006/relationships" xmlns:p="http://schemas.openxmlformats.org/presentationml/2006/main">
+  <p:tag name="RS_CLASSIFICATIONID" val="0"/>
+  <p:tag name="RS_CLASSIFICATION" val="UNRESTRICTED"/>
+</p:tagLst>
+</file>
+
+<file path=ppt/tags/tag15.xml><?xml version="1.0" encoding="utf-8"?>
+<p:tagLst xmlns:a="http://schemas.openxmlformats.org/drawingml/2006/main" xmlns:r="http://schemas.openxmlformats.org/officeDocument/2006/relationships" xmlns:p="http://schemas.openxmlformats.org/presentationml/2006/main">
+  <p:tag name="RS_CLASSIFICATIONID" val="0"/>
+  <p:tag name="RS_CLASSIFICATION" val="UNRESTRICTED"/>
+</p:tagLst>
+</file>
+
+<file path=ppt/tags/tag16.xml><?xml version="1.0" encoding="utf-8"?>
+<p:tagLst xmlns:a="http://schemas.openxmlformats.org/drawingml/2006/main" xmlns:r="http://schemas.openxmlformats.org/officeDocument/2006/relationships" xmlns:p="http://schemas.openxmlformats.org/presentationml/2006/main">
+  <p:tag name="RS_CLASSIFICATIONID" val="0"/>
+  <p:tag name="RS_CLASSIFICATION" val="UNRESTRICTED"/>
+</p:tagLst>
+</file>
+
+<file path=ppt/tags/tag17.xml><?xml version="1.0" encoding="utf-8"?>
+<p:tagLst xmlns:a="http://schemas.openxmlformats.org/drawingml/2006/main" xmlns:r="http://schemas.openxmlformats.org/officeDocument/2006/relationships" xmlns:p="http://schemas.openxmlformats.org/presentationml/2006/main">
+  <p:tag name="RS_CLASSIFICATIONID" val="0"/>
+  <p:tag name="RS_CLASSIFICATION" val="UNRESTRICTED"/>
+</p:tagLst>
+</file>
+
+<file path=ppt/tags/tag18.xml><?xml version="1.0" encoding="utf-8"?>
+<p:tagLst xmlns:a="http://schemas.openxmlformats.org/drawingml/2006/main" xmlns:r="http://schemas.openxmlformats.org/officeDocument/2006/relationships" xmlns:p="http://schemas.openxmlformats.org/presentationml/2006/main">
+  <p:tag name="RS_CLASSIFICATIONID" val="0"/>
+  <p:tag name="RS_CLASSIFICATION" val="UNRESTRICTED"/>
+</p:tagLst>
+</file>
+
+<file path=ppt/tags/tag19.xml><?xml version="1.0" encoding="utf-8"?>
+<p:tagLst xmlns:a="http://schemas.openxmlformats.org/drawingml/2006/main" xmlns:r="http://schemas.openxmlformats.org/officeDocument/2006/relationships" xmlns:p="http://schemas.openxmlformats.org/presentationml/2006/main">
+  <p:tag name="RS_CLASSIFICATIONID" val="0"/>
+  <p:tag name="RS_CLASSIFICATION" val="UNRESTRICTED"/>
+</p:tagLst>
+</file>
+
+<file path=ppt/tags/tag2.xml><?xml version="1.0" encoding="utf-8"?>
+<p:tagLst xmlns:a="http://schemas.openxmlformats.org/drawingml/2006/main" xmlns:r="http://schemas.openxmlformats.org/officeDocument/2006/relationships" xmlns:p="http://schemas.openxmlformats.org/presentationml/2006/main">
+  <p:tag name="RS_CLASSIFICATIONID" val="0"/>
+  <p:tag name="RS_CLASSIFICATION" val="UNRESTRICTED"/>
+</p:tagLst>
+</file>
+
+<file path=ppt/tags/tag20.xml><?xml version="1.0" encoding="utf-8"?>
+<p:tagLst xmlns:a="http://schemas.openxmlformats.org/drawingml/2006/main" xmlns:r="http://schemas.openxmlformats.org/officeDocument/2006/relationships" xmlns:p="http://schemas.openxmlformats.org/presentationml/2006/main">
+  <p:tag name="RS_CLASSIFICATIONID" val="0"/>
+  <p:tag name="RS_CLASSIFICATION" val="UNRESTRICTED"/>
+</p:tagLst>
+</file>
+
+<file path=ppt/tags/tag21.xml><?xml version="1.0" encoding="utf-8"?>
+<p:tagLst xmlns:a="http://schemas.openxmlformats.org/drawingml/2006/main" xmlns:r="http://schemas.openxmlformats.org/officeDocument/2006/relationships" xmlns:p="http://schemas.openxmlformats.org/presentationml/2006/main">
+  <p:tag name="RS_CLASSIFICATIONID" val="0"/>
+  <p:tag name="RS_CLASSIFICATION" val="UNRESTRICTED"/>
+</p:tagLst>
+</file>
+
+<file path=ppt/tags/tag22.xml><?xml version="1.0" encoding="utf-8"?>
+<p:tagLst xmlns:a="http://schemas.openxmlformats.org/drawingml/2006/main" xmlns:r="http://schemas.openxmlformats.org/officeDocument/2006/relationships" xmlns:p="http://schemas.openxmlformats.org/presentationml/2006/main">
+  <p:tag name="RS_CLASSIFICATIONID" val="0"/>
+  <p:tag name="RS_CLASSIFICATION" val="UNRESTRICTED"/>
+</p:tagLst>
+</file>
+
+<file path=ppt/tags/tag23.xml><?xml version="1.0" encoding="utf-8"?>
+<p:tagLst xmlns:a="http://schemas.openxmlformats.org/drawingml/2006/main" xmlns:r="http://schemas.openxmlformats.org/officeDocument/2006/relationships" xmlns:p="http://schemas.openxmlformats.org/presentationml/2006/main">
+  <p:tag name="RS_CLASSIFICATIONID" val="0"/>
+  <p:tag name="RS_CLASSIFICATION" val="UNRESTRICTED"/>
+</p:tagLst>
+</file>
+
+<file path=ppt/tags/tag3.xml><?xml version="1.0" encoding="utf-8"?>
+<p:tagLst xmlns:a="http://schemas.openxmlformats.org/drawingml/2006/main" xmlns:r="http://schemas.openxmlformats.org/officeDocument/2006/relationships" xmlns:p="http://schemas.openxmlformats.org/presentationml/2006/main">
+  <p:tag name="RS_CLASSIFICATIONID" val="0"/>
+  <p:tag name="RS_CLASSIFICATION" val="UNRESTRICTED"/>
+</p:tagLst>
+</file>
+
+<file path=ppt/tags/tag4.xml><?xml version="1.0" encoding="utf-8"?>
+<p:tagLst xmlns:a="http://schemas.openxmlformats.org/drawingml/2006/main" xmlns:r="http://schemas.openxmlformats.org/officeDocument/2006/relationships" xmlns:p="http://schemas.openxmlformats.org/presentationml/2006/main">
+  <p:tag name="RS_CLASSIFICATIONID" val="0"/>
+  <p:tag name="RS_CLASSIFICATION" val="UNRESTRICTED"/>
+</p:tagLst>
+</file>
+
+<file path=ppt/tags/tag5.xml><?xml version="1.0" encoding="utf-8"?>
+<p:tagLst xmlns:a="http://schemas.openxmlformats.org/drawingml/2006/main" xmlns:r="http://schemas.openxmlformats.org/officeDocument/2006/relationships" xmlns:p="http://schemas.openxmlformats.org/presentationml/2006/main">
+  <p:tag name="RS_CLASSIFICATIONID" val="0"/>
+  <p:tag name="RS_CLASSIFICATION" val="UNRESTRICTED"/>
+</p:tagLst>
+</file>
+
+<file path=ppt/tags/tag6.xml><?xml version="1.0" encoding="utf-8"?>
+<p:tagLst xmlns:a="http://schemas.openxmlformats.org/drawingml/2006/main" xmlns:r="http://schemas.openxmlformats.org/officeDocument/2006/relationships" xmlns:p="http://schemas.openxmlformats.org/presentationml/2006/main">
+  <p:tag name="RS_CLASSIFICATIONID" val="0"/>
+  <p:tag name="RS_CLASSIFICATION" val="UNRESTRICTED"/>
+</p:tagLst>
+</file>
+
+<file path=ppt/tags/tag7.xml><?xml version="1.0" encoding="utf-8"?>
+<p:tagLst xmlns:a="http://schemas.openxmlformats.org/drawingml/2006/main" xmlns:r="http://schemas.openxmlformats.org/officeDocument/2006/relationships" xmlns:p="http://schemas.openxmlformats.org/presentationml/2006/main">
+  <p:tag name="RS_CLASSIFICATIONID" val="0"/>
+  <p:tag name="RS_CLASSIFICATION" val="UNRESTRICTED"/>
+</p:tagLst>
+</file>
+
+<file path=ppt/tags/tag8.xml><?xml version="1.0" encoding="utf-8"?>
+<p:tagLst xmlns:a="http://schemas.openxmlformats.org/drawingml/2006/main" xmlns:r="http://schemas.openxmlformats.org/officeDocument/2006/relationships" xmlns:p="http://schemas.openxmlformats.org/presentationml/2006/main">
+  <p:tag name="RS_CLASSIFICATIONID" val="0"/>
+  <p:tag name="RS_CLASSIFICATION" val="UNRESTRICTED"/>
+</p:tagLst>
+</file>
+
+<file path=ppt/tags/tag9.xml><?xml version="1.0" encoding="utf-8"?>
+<p:tagLst xmlns:a="http://schemas.openxmlformats.org/drawingml/2006/main" xmlns:r="http://schemas.openxmlformats.org/officeDocument/2006/relationships" xmlns:p="http://schemas.openxmlformats.org/presentationml/2006/main">
+  <p:tag name="RS_CLASSIFICATIONID" val="0"/>
+  <p:tag name="RS_CLASSIFICATION" val="UNRESTRICTED"/>
+</p:tagLst>
 </file>
 
 <file path=ppt/theme/theme1.xml><?xml version="1.0" encoding="utf-8"?>

</xml_diff>